<commit_message>
Exam reading list started. First three docs modified
</commit_message>
<xml_diff>
--- a/Responsibilities_services_or_components_ClientCarrierServer.pptx
+++ b/Responsibilities_services_or_components_ClientCarrierServer.pptx
@@ -156,10 +156,9 @@
           </a:lstStyle>
           <a:p>
             <a:r>
-              <a:rPr lang="en-US" smtClean="0"/>
+              <a:rPr lang="en-US"/>
               <a:t>Click to edit Master title style</a:t>
             </a:r>
-            <a:endParaRPr lang="en-US"/>
           </a:p>
         </p:txBody>
       </p:sp>
@@ -221,10 +220,9 @@
           </a:lstStyle>
           <a:p>
             <a:r>
-              <a:rPr lang="en-US" smtClean="0"/>
+              <a:rPr lang="en-US"/>
               <a:t>Click to edit Master subtitle style</a:t>
             </a:r>
-            <a:endParaRPr lang="en-US"/>
           </a:p>
         </p:txBody>
       </p:sp>
@@ -252,7 +250,7 @@
           </a:lstStyle>
           <a:p>
             <a:r>
-              <a:rPr lang="fi-FI" dirty="0" smtClean="0"/>
+              <a:rPr lang="fi-FI" dirty="0"/>
               <a:t>2014-04-09</a:t>
             </a:r>
             <a:endParaRPr lang="en-US" dirty="0"/>
@@ -283,7 +281,7 @@
           </a:lstStyle>
           <a:p>
             <a:r>
-              <a:rPr lang="fi-FI" dirty="0" smtClean="0"/>
+              <a:rPr lang="fi-FI" dirty="0"/>
               <a:t>© Juhani Välimäki</a:t>
             </a:r>
             <a:endParaRPr lang="en-US" dirty="0"/>
@@ -368,10 +366,9 @@
           <a:lstStyle/>
           <a:p>
             <a:r>
-              <a:rPr lang="en-US" smtClean="0"/>
+              <a:rPr lang="en-US"/>
               <a:t>Click to edit Master title style</a:t>
             </a:r>
-            <a:endParaRPr lang="en-US"/>
           </a:p>
         </p:txBody>
       </p:sp>
@@ -392,38 +389,37 @@
           <a:p>
             <a:pPr lvl="0"/>
             <a:r>
-              <a:rPr lang="en-US" smtClean="0"/>
+              <a:rPr lang="en-US"/>
               <a:t>Click to edit Master text styles</a:t>
             </a:r>
           </a:p>
           <a:p>
             <a:pPr lvl="1"/>
             <a:r>
-              <a:rPr lang="en-US" smtClean="0"/>
+              <a:rPr lang="en-US"/>
               <a:t>Second level</a:t>
             </a:r>
           </a:p>
           <a:p>
             <a:pPr lvl="2"/>
             <a:r>
-              <a:rPr lang="en-US" smtClean="0"/>
+              <a:rPr lang="en-US"/>
               <a:t>Third level</a:t>
             </a:r>
           </a:p>
           <a:p>
             <a:pPr lvl="3"/>
             <a:r>
-              <a:rPr lang="en-US" smtClean="0"/>
+              <a:rPr lang="en-US"/>
               <a:t>Fourth level</a:t>
             </a:r>
           </a:p>
           <a:p>
             <a:pPr lvl="4"/>
             <a:r>
-              <a:rPr lang="en-US" smtClean="0"/>
+              <a:rPr lang="en-US"/>
               <a:t>Fifth level</a:t>
             </a:r>
-            <a:endParaRPr lang="en-US"/>
           </a:p>
         </p:txBody>
       </p:sp>
@@ -444,7 +440,7 @@
           <a:p>
             <a:fld id="{7DDC757A-7F51-4268-BF37-8465B749C48A}" type="datetimeFigureOut">
               <a:rPr lang="en-US" smtClean="0"/>
-              <a:t>11/6/2017</a:t>
+              <a:t>11/16/2020</a:t>
             </a:fld>
             <a:endParaRPr lang="en-US"/>
           </a:p>
@@ -543,10 +539,9 @@
           <a:lstStyle/>
           <a:p>
             <a:r>
-              <a:rPr lang="en-US" smtClean="0"/>
+              <a:rPr lang="en-US"/>
               <a:t>Click to edit Master title style</a:t>
             </a:r>
-            <a:endParaRPr lang="en-US"/>
           </a:p>
         </p:txBody>
       </p:sp>
@@ -572,38 +567,37 @@
           <a:p>
             <a:pPr lvl="0"/>
             <a:r>
-              <a:rPr lang="en-US" smtClean="0"/>
+              <a:rPr lang="en-US"/>
               <a:t>Click to edit Master text styles</a:t>
             </a:r>
           </a:p>
           <a:p>
             <a:pPr lvl="1"/>
             <a:r>
-              <a:rPr lang="en-US" smtClean="0"/>
+              <a:rPr lang="en-US"/>
               <a:t>Second level</a:t>
             </a:r>
           </a:p>
           <a:p>
             <a:pPr lvl="2"/>
             <a:r>
-              <a:rPr lang="en-US" smtClean="0"/>
+              <a:rPr lang="en-US"/>
               <a:t>Third level</a:t>
             </a:r>
           </a:p>
           <a:p>
             <a:pPr lvl="3"/>
             <a:r>
-              <a:rPr lang="en-US" smtClean="0"/>
+              <a:rPr lang="en-US"/>
               <a:t>Fourth level</a:t>
             </a:r>
           </a:p>
           <a:p>
             <a:pPr lvl="4"/>
             <a:r>
-              <a:rPr lang="en-US" smtClean="0"/>
+              <a:rPr lang="en-US"/>
               <a:t>Fifth level</a:t>
             </a:r>
-            <a:endParaRPr lang="en-US"/>
           </a:p>
         </p:txBody>
       </p:sp>
@@ -624,7 +618,7 @@
           <a:p>
             <a:fld id="{7DDC757A-7F51-4268-BF37-8465B749C48A}" type="datetimeFigureOut">
               <a:rPr lang="en-US" smtClean="0"/>
-              <a:t>11/6/2017</a:t>
+              <a:t>11/16/2020</a:t>
             </a:fld>
             <a:endParaRPr lang="en-US"/>
           </a:p>
@@ -718,10 +712,9 @@
           <a:lstStyle/>
           <a:p>
             <a:r>
-              <a:rPr lang="en-US" smtClean="0"/>
+              <a:rPr lang="en-US"/>
               <a:t>Click to edit Master title style</a:t>
             </a:r>
-            <a:endParaRPr lang="en-US"/>
           </a:p>
         </p:txBody>
       </p:sp>
@@ -742,38 +735,37 @@
           <a:p>
             <a:pPr lvl="0"/>
             <a:r>
-              <a:rPr lang="en-US" smtClean="0"/>
+              <a:rPr lang="en-US"/>
               <a:t>Click to edit Master text styles</a:t>
             </a:r>
           </a:p>
           <a:p>
             <a:pPr lvl="1"/>
             <a:r>
-              <a:rPr lang="en-US" smtClean="0"/>
+              <a:rPr lang="en-US"/>
               <a:t>Second level</a:t>
             </a:r>
           </a:p>
           <a:p>
             <a:pPr lvl="2"/>
             <a:r>
-              <a:rPr lang="en-US" smtClean="0"/>
+              <a:rPr lang="en-US"/>
               <a:t>Third level</a:t>
             </a:r>
           </a:p>
           <a:p>
             <a:pPr lvl="3"/>
             <a:r>
-              <a:rPr lang="en-US" smtClean="0"/>
+              <a:rPr lang="en-US"/>
               <a:t>Fourth level</a:t>
             </a:r>
           </a:p>
           <a:p>
             <a:pPr lvl="4"/>
             <a:r>
-              <a:rPr lang="en-US" smtClean="0"/>
+              <a:rPr lang="en-US"/>
               <a:t>Fifth level</a:t>
             </a:r>
-            <a:endParaRPr lang="en-US"/>
           </a:p>
         </p:txBody>
       </p:sp>
@@ -794,7 +786,7 @@
           <a:p>
             <a:fld id="{7DDC757A-7F51-4268-BF37-8465B749C48A}" type="datetimeFigureOut">
               <a:rPr lang="en-US" smtClean="0"/>
-              <a:t>11/6/2017</a:t>
+              <a:t>11/16/2020</a:t>
             </a:fld>
             <a:endParaRPr lang="en-US"/>
           </a:p>
@@ -897,10 +889,9 @@
           </a:lstStyle>
           <a:p>
             <a:r>
-              <a:rPr lang="en-US" smtClean="0"/>
+              <a:rPr lang="en-US"/>
               <a:t>Click to edit Master title style</a:t>
             </a:r>
-            <a:endParaRPr lang="en-US"/>
           </a:p>
         </p:txBody>
       </p:sp>
@@ -1017,7 +1008,7 @@
           <a:p>
             <a:pPr lvl="0"/>
             <a:r>
-              <a:rPr lang="en-US" smtClean="0"/>
+              <a:rPr lang="en-US"/>
               <a:t>Click to edit Master text styles</a:t>
             </a:r>
           </a:p>
@@ -1040,7 +1031,7 @@
           <a:p>
             <a:fld id="{7DDC757A-7F51-4268-BF37-8465B749C48A}" type="datetimeFigureOut">
               <a:rPr lang="en-US" smtClean="0"/>
-              <a:t>11/6/2017</a:t>
+              <a:t>11/16/2020</a:t>
             </a:fld>
             <a:endParaRPr lang="en-US"/>
           </a:p>
@@ -1134,10 +1125,9 @@
           <a:lstStyle/>
           <a:p>
             <a:r>
-              <a:rPr lang="en-US" smtClean="0"/>
+              <a:rPr lang="en-US"/>
               <a:t>Click to edit Master title style</a:t>
             </a:r>
-            <a:endParaRPr lang="en-US"/>
           </a:p>
         </p:txBody>
       </p:sp>
@@ -1163,38 +1153,37 @@
           <a:p>
             <a:pPr lvl="0"/>
             <a:r>
-              <a:rPr lang="en-US" smtClean="0"/>
+              <a:rPr lang="en-US"/>
               <a:t>Click to edit Master text styles</a:t>
             </a:r>
           </a:p>
           <a:p>
             <a:pPr lvl="1"/>
             <a:r>
-              <a:rPr lang="en-US" smtClean="0"/>
+              <a:rPr lang="en-US"/>
               <a:t>Second level</a:t>
             </a:r>
           </a:p>
           <a:p>
             <a:pPr lvl="2"/>
             <a:r>
-              <a:rPr lang="en-US" smtClean="0"/>
+              <a:rPr lang="en-US"/>
               <a:t>Third level</a:t>
             </a:r>
           </a:p>
           <a:p>
             <a:pPr lvl="3"/>
             <a:r>
-              <a:rPr lang="en-US" smtClean="0"/>
+              <a:rPr lang="en-US"/>
               <a:t>Fourth level</a:t>
             </a:r>
           </a:p>
           <a:p>
             <a:pPr lvl="4"/>
             <a:r>
-              <a:rPr lang="en-US" smtClean="0"/>
+              <a:rPr lang="en-US"/>
               <a:t>Fifth level</a:t>
             </a:r>
-            <a:endParaRPr lang="en-US"/>
           </a:p>
         </p:txBody>
       </p:sp>
@@ -1220,38 +1209,37 @@
           <a:p>
             <a:pPr lvl="0"/>
             <a:r>
-              <a:rPr lang="en-US" smtClean="0"/>
+              <a:rPr lang="en-US"/>
               <a:t>Click to edit Master text styles</a:t>
             </a:r>
           </a:p>
           <a:p>
             <a:pPr lvl="1"/>
             <a:r>
-              <a:rPr lang="en-US" smtClean="0"/>
+              <a:rPr lang="en-US"/>
               <a:t>Second level</a:t>
             </a:r>
           </a:p>
           <a:p>
             <a:pPr lvl="2"/>
             <a:r>
-              <a:rPr lang="en-US" smtClean="0"/>
+              <a:rPr lang="en-US"/>
               <a:t>Third level</a:t>
             </a:r>
           </a:p>
           <a:p>
             <a:pPr lvl="3"/>
             <a:r>
-              <a:rPr lang="en-US" smtClean="0"/>
+              <a:rPr lang="en-US"/>
               <a:t>Fourth level</a:t>
             </a:r>
           </a:p>
           <a:p>
             <a:pPr lvl="4"/>
             <a:r>
-              <a:rPr lang="en-US" smtClean="0"/>
+              <a:rPr lang="en-US"/>
               <a:t>Fifth level</a:t>
             </a:r>
-            <a:endParaRPr lang="en-US"/>
           </a:p>
         </p:txBody>
       </p:sp>
@@ -1272,7 +1260,7 @@
           <a:p>
             <a:fld id="{7DDC757A-7F51-4268-BF37-8465B749C48A}" type="datetimeFigureOut">
               <a:rPr lang="en-US" smtClean="0"/>
-              <a:t>11/6/2017</a:t>
+              <a:t>11/16/2020</a:t>
             </a:fld>
             <a:endParaRPr lang="en-US"/>
           </a:p>
@@ -1371,10 +1359,9 @@
           <a:lstStyle/>
           <a:p>
             <a:r>
-              <a:rPr lang="en-US" smtClean="0"/>
+              <a:rPr lang="en-US"/>
               <a:t>Click to edit Master title style</a:t>
             </a:r>
-            <a:endParaRPr lang="en-US"/>
           </a:p>
         </p:txBody>
       </p:sp>
@@ -1437,7 +1424,7 @@
           <a:p>
             <a:pPr lvl="0"/>
             <a:r>
-              <a:rPr lang="en-US" smtClean="0"/>
+              <a:rPr lang="en-US"/>
               <a:t>Click to edit Master text styles</a:t>
             </a:r>
           </a:p>
@@ -1465,38 +1452,37 @@
           <a:p>
             <a:pPr lvl="0"/>
             <a:r>
-              <a:rPr lang="en-US" smtClean="0"/>
+              <a:rPr lang="en-US"/>
               <a:t>Click to edit Master text styles</a:t>
             </a:r>
           </a:p>
           <a:p>
             <a:pPr lvl="1"/>
             <a:r>
-              <a:rPr lang="en-US" smtClean="0"/>
+              <a:rPr lang="en-US"/>
               <a:t>Second level</a:t>
             </a:r>
           </a:p>
           <a:p>
             <a:pPr lvl="2"/>
             <a:r>
-              <a:rPr lang="en-US" smtClean="0"/>
+              <a:rPr lang="en-US"/>
               <a:t>Third level</a:t>
             </a:r>
           </a:p>
           <a:p>
             <a:pPr lvl="3"/>
             <a:r>
-              <a:rPr lang="en-US" smtClean="0"/>
+              <a:rPr lang="en-US"/>
               <a:t>Fourth level</a:t>
             </a:r>
           </a:p>
           <a:p>
             <a:pPr lvl="4"/>
             <a:r>
-              <a:rPr lang="en-US" smtClean="0"/>
+              <a:rPr lang="en-US"/>
               <a:t>Fifth level</a:t>
             </a:r>
-            <a:endParaRPr lang="en-US"/>
           </a:p>
         </p:txBody>
       </p:sp>
@@ -1559,7 +1545,7 @@
           <a:p>
             <a:pPr lvl="0"/>
             <a:r>
-              <a:rPr lang="en-US" smtClean="0"/>
+              <a:rPr lang="en-US"/>
               <a:t>Click to edit Master text styles</a:t>
             </a:r>
           </a:p>
@@ -1587,38 +1573,37 @@
           <a:p>
             <a:pPr lvl="0"/>
             <a:r>
-              <a:rPr lang="en-US" smtClean="0"/>
+              <a:rPr lang="en-US"/>
               <a:t>Click to edit Master text styles</a:t>
             </a:r>
           </a:p>
           <a:p>
             <a:pPr lvl="1"/>
             <a:r>
-              <a:rPr lang="en-US" smtClean="0"/>
+              <a:rPr lang="en-US"/>
               <a:t>Second level</a:t>
             </a:r>
           </a:p>
           <a:p>
             <a:pPr lvl="2"/>
             <a:r>
-              <a:rPr lang="en-US" smtClean="0"/>
+              <a:rPr lang="en-US"/>
               <a:t>Third level</a:t>
             </a:r>
           </a:p>
           <a:p>
             <a:pPr lvl="3"/>
             <a:r>
-              <a:rPr lang="en-US" smtClean="0"/>
+              <a:rPr lang="en-US"/>
               <a:t>Fourth level</a:t>
             </a:r>
           </a:p>
           <a:p>
             <a:pPr lvl="4"/>
             <a:r>
-              <a:rPr lang="en-US" smtClean="0"/>
+              <a:rPr lang="en-US"/>
               <a:t>Fifth level</a:t>
             </a:r>
-            <a:endParaRPr lang="en-US"/>
           </a:p>
         </p:txBody>
       </p:sp>
@@ -1639,7 +1624,7 @@
           <a:p>
             <a:fld id="{7DDC757A-7F51-4268-BF37-8465B749C48A}" type="datetimeFigureOut">
               <a:rPr lang="en-US" smtClean="0"/>
-              <a:t>11/6/2017</a:t>
+              <a:t>11/16/2020</a:t>
             </a:fld>
             <a:endParaRPr lang="en-US"/>
           </a:p>
@@ -1733,10 +1718,9 @@
           <a:lstStyle/>
           <a:p>
             <a:r>
-              <a:rPr lang="en-US" smtClean="0"/>
+              <a:rPr lang="en-US"/>
               <a:t>Click to edit Master title style</a:t>
             </a:r>
-            <a:endParaRPr lang="en-US"/>
           </a:p>
         </p:txBody>
       </p:sp>
@@ -1757,7 +1741,7 @@
           <a:p>
             <a:fld id="{7DDC757A-7F51-4268-BF37-8465B749C48A}" type="datetimeFigureOut">
               <a:rPr lang="en-US" smtClean="0"/>
-              <a:t>11/6/2017</a:t>
+              <a:t>11/16/2020</a:t>
             </a:fld>
             <a:endParaRPr lang="en-US"/>
           </a:p>
@@ -1852,7 +1836,7 @@
           <a:p>
             <a:fld id="{7DDC757A-7F51-4268-BF37-8465B749C48A}" type="datetimeFigureOut">
               <a:rPr lang="en-US" smtClean="0"/>
-              <a:t>11/6/2017</a:t>
+              <a:t>11/16/2020</a:t>
             </a:fld>
             <a:endParaRPr lang="en-US"/>
           </a:p>
@@ -1955,10 +1939,9 @@
           </a:lstStyle>
           <a:p>
             <a:r>
-              <a:rPr lang="en-US" smtClean="0"/>
+              <a:rPr lang="en-US"/>
               <a:t>Click to edit Master title style</a:t>
             </a:r>
-            <a:endParaRPr lang="en-US"/>
           </a:p>
         </p:txBody>
       </p:sp>
@@ -2012,38 +1995,37 @@
           <a:p>
             <a:pPr lvl="0"/>
             <a:r>
-              <a:rPr lang="en-US" smtClean="0"/>
+              <a:rPr lang="en-US"/>
               <a:t>Click to edit Master text styles</a:t>
             </a:r>
           </a:p>
           <a:p>
             <a:pPr lvl="1"/>
             <a:r>
-              <a:rPr lang="en-US" smtClean="0"/>
+              <a:rPr lang="en-US"/>
               <a:t>Second level</a:t>
             </a:r>
           </a:p>
           <a:p>
             <a:pPr lvl="2"/>
             <a:r>
-              <a:rPr lang="en-US" smtClean="0"/>
+              <a:rPr lang="en-US"/>
               <a:t>Third level</a:t>
             </a:r>
           </a:p>
           <a:p>
             <a:pPr lvl="3"/>
             <a:r>
-              <a:rPr lang="en-US" smtClean="0"/>
+              <a:rPr lang="en-US"/>
               <a:t>Fourth level</a:t>
             </a:r>
           </a:p>
           <a:p>
             <a:pPr lvl="4"/>
             <a:r>
-              <a:rPr lang="en-US" smtClean="0"/>
+              <a:rPr lang="en-US"/>
               <a:t>Fifth level</a:t>
             </a:r>
-            <a:endParaRPr lang="en-US"/>
           </a:p>
         </p:txBody>
       </p:sp>
@@ -2106,7 +2088,7 @@
           <a:p>
             <a:pPr lvl="0"/>
             <a:r>
-              <a:rPr lang="en-US" smtClean="0"/>
+              <a:rPr lang="en-US"/>
               <a:t>Click to edit Master text styles</a:t>
             </a:r>
           </a:p>
@@ -2129,7 +2111,7 @@
           <a:p>
             <a:fld id="{7DDC757A-7F51-4268-BF37-8465B749C48A}" type="datetimeFigureOut">
               <a:rPr lang="en-US" smtClean="0"/>
-              <a:t>11/6/2017</a:t>
+              <a:t>11/16/2020</a:t>
             </a:fld>
             <a:endParaRPr lang="en-US"/>
           </a:p>
@@ -2232,10 +2214,9 @@
           </a:lstStyle>
           <a:p>
             <a:r>
-              <a:rPr lang="en-US" smtClean="0"/>
+              <a:rPr lang="en-US"/>
               <a:t>Click to edit Master title style</a:t>
             </a:r>
-            <a:endParaRPr lang="en-US"/>
           </a:p>
         </p:txBody>
       </p:sp>
@@ -2359,7 +2340,7 @@
           <a:p>
             <a:pPr lvl="0"/>
             <a:r>
-              <a:rPr lang="en-US" smtClean="0"/>
+              <a:rPr lang="en-US"/>
               <a:t>Click to edit Master text styles</a:t>
             </a:r>
           </a:p>
@@ -2382,7 +2363,7 @@
           <a:p>
             <a:fld id="{7DDC757A-7F51-4268-BF37-8465B749C48A}" type="datetimeFigureOut">
               <a:rPr lang="en-US" smtClean="0"/>
-              <a:t>11/6/2017</a:t>
+              <a:t>11/16/2020</a:t>
             </a:fld>
             <a:endParaRPr lang="en-US"/>
           </a:p>
@@ -2491,10 +2472,9 @@
           <a:lstStyle/>
           <a:p>
             <a:r>
-              <a:rPr lang="en-US" smtClean="0"/>
+              <a:rPr lang="en-US"/>
               <a:t>Click to edit Master title style</a:t>
             </a:r>
-            <a:endParaRPr lang="en-US"/>
           </a:p>
         </p:txBody>
       </p:sp>
@@ -2525,38 +2505,37 @@
           <a:p>
             <a:pPr lvl="0"/>
             <a:r>
-              <a:rPr lang="en-US" smtClean="0"/>
+              <a:rPr lang="en-US"/>
               <a:t>Click to edit Master text styles</a:t>
             </a:r>
           </a:p>
           <a:p>
             <a:pPr lvl="1"/>
             <a:r>
-              <a:rPr lang="en-US" smtClean="0"/>
+              <a:rPr lang="en-US"/>
               <a:t>Second level</a:t>
             </a:r>
           </a:p>
           <a:p>
             <a:pPr lvl="2"/>
             <a:r>
-              <a:rPr lang="en-US" smtClean="0"/>
+              <a:rPr lang="en-US"/>
               <a:t>Third level</a:t>
             </a:r>
           </a:p>
           <a:p>
             <a:pPr lvl="3"/>
             <a:r>
-              <a:rPr lang="en-US" smtClean="0"/>
+              <a:rPr lang="en-US"/>
               <a:t>Fourth level</a:t>
             </a:r>
           </a:p>
           <a:p>
             <a:pPr lvl="4"/>
             <a:r>
-              <a:rPr lang="en-US" smtClean="0"/>
+              <a:rPr lang="en-US"/>
               <a:t>Fifth level</a:t>
             </a:r>
-            <a:endParaRPr lang="en-US"/>
           </a:p>
         </p:txBody>
       </p:sp>
@@ -2595,7 +2574,7 @@
           <a:p>
             <a:fld id="{7DDC757A-7F51-4268-BF37-8465B749C48A}" type="datetimeFigureOut">
               <a:rPr lang="en-US" smtClean="0"/>
-              <a:t>11/6/2017</a:t>
+              <a:t>11/16/2020</a:t>
             </a:fld>
             <a:endParaRPr lang="en-US"/>
           </a:p>
@@ -3016,10 +2995,9 @@
           <a:lstStyle/>
           <a:p>
             <a:r>
-              <a:rPr lang="en-US" dirty="0" smtClean="0"/>
+              <a:rPr lang="en-US" dirty="0"/>
               <a:t>Responsibilities, services or components? of…</a:t>
             </a:r>
-            <a:endParaRPr lang="en-US" dirty="0"/>
           </a:p>
         </p:txBody>
       </p:sp>
@@ -3039,16 +3017,8 @@
           <a:lstStyle/>
           <a:p>
             <a:r>
-              <a:rPr lang="fi-FI" dirty="0" smtClean="0"/>
-              <a:t>1) Client 2) </a:t>
-            </a:r>
-            <a:r>
-              <a:rPr lang="fi-FI" dirty="0" smtClean="0"/>
-              <a:t>Carrier/Internet </a:t>
-            </a:r>
-            <a:r>
-              <a:rPr lang="fi-FI" dirty="0" smtClean="0"/>
-              <a:t>3) Server</a:t>
+              <a:rPr lang="fi-FI" dirty="0"/>
+              <a:t>1) Client 2) Carrier/Internet 3) Server</a:t>
             </a:r>
             <a:endParaRPr lang="en-US" dirty="0"/>
           </a:p>
@@ -3093,7 +3063,13 @@
       </p:sp>
       <p:sp>
         <p:nvSpPr>
-          <p:cNvPr id="7" name="Date Placeholder 3"/>
+          <p:cNvPr id="9" name="Date Placeholder 3">
+            <a:extLst>
+              <a:ext uri="{FF2B5EF4-FFF2-40B4-BE49-F238E27FC236}">
+                <a16:creationId xmlns:a16="http://schemas.microsoft.com/office/drawing/2014/main" id="{A73FCE67-7E1B-40D1-967F-08FEE5A424DE}"/>
+              </a:ext>
+            </a:extLst>
+          </p:cNvPr>
           <p:cNvSpPr>
             <a:spLocks noGrp="1"/>
           </p:cNvSpPr>
@@ -3120,8 +3096,8 @@
           </a:lstStyle>
           <a:p>
             <a:r>
-              <a:rPr lang="fi-FI" dirty="0" smtClean="0"/>
-              <a:t>2017-11-06</a:t>
+              <a:rPr lang="fi-FI" dirty="0"/>
+              <a:t>2020-11-16</a:t>
             </a:r>
             <a:endParaRPr lang="en-US" dirty="0"/>
           </a:p>
@@ -3129,7 +3105,13 @@
       </p:sp>
       <p:sp>
         <p:nvSpPr>
-          <p:cNvPr id="8" name="Footer Placeholder 4"/>
+          <p:cNvPr id="10" name="Footer Placeholder 4">
+            <a:extLst>
+              <a:ext uri="{FF2B5EF4-FFF2-40B4-BE49-F238E27FC236}">
+                <a16:creationId xmlns:a16="http://schemas.microsoft.com/office/drawing/2014/main" id="{3BABF449-F6E7-464F-8461-637808A09E30}"/>
+              </a:ext>
+            </a:extLst>
+          </p:cNvPr>
           <p:cNvSpPr>
             <a:spLocks noGrp="1"/>
           </p:cNvSpPr>
@@ -3156,12 +3138,8 @@
           </a:lstStyle>
           <a:p>
             <a:r>
-              <a:rPr lang="fi-FI" dirty="0" smtClean="0"/>
-              <a:t>© Juhani </a:t>
-            </a:r>
-            <a:r>
-              <a:rPr lang="fi-FI" dirty="0" smtClean="0"/>
-              <a:t>Välimäki 2012-2017</a:t>
+              <a:rPr lang="fi-FI" dirty="0"/>
+              <a:t>© Juhani Välimäki 2012-2020</a:t>
             </a:r>
             <a:endParaRPr lang="en-US" dirty="0"/>
           </a:p>
@@ -3177,13 +3155,6 @@
   <p:clrMapOvr>
     <a:masterClrMapping/>
   </p:clrMapOvr>
-  <p:timing>
-    <p:tnLst>
-      <p:par>
-        <p:cTn id="1" dur="indefinite" restart="never" nodeType="tmRoot"/>
-      </p:par>
-    </p:tnLst>
-  </p:timing>
 </p:sld>
 </file>
 
@@ -3241,7 +3212,7 @@
           <a:lstStyle/>
           <a:p>
             <a:r>
-              <a:rPr lang="en-US" b="1" dirty="0" smtClean="0">
+              <a:rPr lang="en-US" b="1" dirty="0">
                 <a:solidFill>
                   <a:schemeClr val="tx2"/>
                 </a:solidFill>
@@ -3249,19 +3220,12 @@
               <a:t>Client = Browser</a:t>
             </a:r>
             <a:br>
-              <a:rPr lang="en-US" b="1" dirty="0" smtClean="0">
+              <a:rPr lang="en-US" b="1" dirty="0">
                 <a:solidFill>
                   <a:schemeClr val="tx2"/>
                 </a:solidFill>
               </a:rPr>
             </a:br>
-            <a:endParaRPr lang="en-US" b="1" dirty="0" smtClean="0">
-              <a:solidFill>
-                <a:schemeClr val="tx2"/>
-              </a:solidFill>
-            </a:endParaRPr>
-          </a:p>
-          <a:p>
             <a:endParaRPr lang="en-US" b="1" dirty="0">
               <a:solidFill>
                 <a:schemeClr val="tx2"/>
@@ -3269,49 +3233,40 @@
             </a:endParaRPr>
           </a:p>
           <a:p>
+            <a:endParaRPr lang="en-US" b="1" dirty="0">
+              <a:solidFill>
+                <a:schemeClr val="tx2"/>
+              </a:solidFill>
+            </a:endParaRPr>
+          </a:p>
+          <a:p>
             <a:pPr marL="285750" indent="-285750">
               <a:buFont typeface="Arial" panose="020B0604020202020204" pitchFamily="34" charset="0"/>
               <a:buChar char="•"/>
             </a:pPr>
             <a:r>
-              <a:rPr lang="en-US" sz="1600" dirty="0" smtClean="0">
-                <a:solidFill>
-                  <a:schemeClr val="tx2"/>
-                </a:solidFill>
-              </a:rPr>
-              <a:t>Responsibilities, characteristics, features, </a:t>
-            </a:r>
-            <a:r>
-              <a:rPr lang="en-US" sz="1600" dirty="0" smtClean="0">
-                <a:solidFill>
-                  <a:schemeClr val="tx2"/>
-                </a:solidFill>
-              </a:rPr>
-              <a:t>services, capabilities, and/or </a:t>
-            </a:r>
-            <a:r>
-              <a:rPr lang="en-US" sz="1600" dirty="0" smtClean="0">
-                <a:solidFill>
-                  <a:schemeClr val="tx2"/>
-                </a:solidFill>
-              </a:rPr>
-              <a:t>components?</a:t>
+              <a:rPr lang="en-US" sz="1600" dirty="0">
+                <a:solidFill>
+                  <a:schemeClr val="tx2"/>
+                </a:solidFill>
+              </a:rPr>
+              <a:t>Responsibilities, characteristics, features, services, capabilities, and/or components?</a:t>
             </a:r>
             <a:br>
-              <a:rPr lang="en-US" sz="1600" dirty="0" smtClean="0">
+              <a:rPr lang="en-US" sz="1600" dirty="0">
                 <a:solidFill>
                   <a:schemeClr val="tx2"/>
                 </a:solidFill>
               </a:rPr>
             </a:br>
-            <a:endParaRPr lang="en-US" sz="1600" dirty="0" smtClean="0">
+            <a:endParaRPr lang="en-US" sz="1600" dirty="0">
               <a:solidFill>
                 <a:schemeClr val="tx2"/>
               </a:solidFill>
             </a:endParaRPr>
           </a:p>
           <a:p>
-            <a:endParaRPr lang="en-US" sz="1600" dirty="0" smtClean="0">
+            <a:endParaRPr lang="en-US" sz="1600" dirty="0">
               <a:solidFill>
                 <a:schemeClr val="tx2"/>
               </a:solidFill>
@@ -3363,7 +3318,7 @@
           <a:lstStyle/>
           <a:p>
             <a:r>
-              <a:rPr lang="en-US" b="1" dirty="0" smtClean="0">
+              <a:rPr lang="en-US" b="1" dirty="0">
                 <a:solidFill>
                   <a:schemeClr val="tx2"/>
                 </a:solidFill>
@@ -3371,7 +3326,7 @@
               <a:t>Internet, TCP/IP, </a:t>
             </a:r>
             <a:r>
-              <a:rPr lang="en-US" b="1" dirty="0" err="1" smtClean="0">
+              <a:rPr lang="en-US" b="1" dirty="0" err="1">
                 <a:solidFill>
                   <a:schemeClr val="tx2"/>
                 </a:solidFill>
@@ -3379,7 +3334,7 @@
               <a:t>HttpRequest</a:t>
             </a:r>
             <a:r>
-              <a:rPr lang="en-US" b="1" dirty="0" smtClean="0">
+              <a:rPr lang="en-US" b="1" dirty="0">
                 <a:solidFill>
                   <a:schemeClr val="tx2"/>
                 </a:solidFill>
@@ -3387,7 +3342,7 @@
               <a:t>, </a:t>
             </a:r>
             <a:r>
-              <a:rPr lang="en-US" b="1" dirty="0" err="1" smtClean="0">
+              <a:rPr lang="en-US" b="1" dirty="0" err="1">
                 <a:solidFill>
                   <a:schemeClr val="tx2"/>
                 </a:solidFill>
@@ -3395,7 +3350,7 @@
               <a:t>HttpResponse</a:t>
             </a:r>
             <a:r>
-              <a:rPr lang="en-US" b="1" dirty="0" smtClean="0">
+              <a:rPr lang="en-US" b="1" dirty="0">
                 <a:solidFill>
                   <a:schemeClr val="tx2"/>
                 </a:solidFill>
@@ -3403,13 +3358,13 @@
               <a:t>, Https, SSL, …</a:t>
             </a:r>
             <a:br>
-              <a:rPr lang="en-US" b="1" dirty="0" smtClean="0">
+              <a:rPr lang="en-US" b="1" dirty="0">
                 <a:solidFill>
                   <a:schemeClr val="tx2"/>
                 </a:solidFill>
               </a:rPr>
             </a:br>
-            <a:endParaRPr lang="en-US" b="1" dirty="0" smtClean="0">
+            <a:endParaRPr lang="en-US" b="1" dirty="0">
               <a:solidFill>
                 <a:schemeClr val="tx2"/>
               </a:solidFill>
@@ -3421,60 +3376,28 @@
               <a:buChar char="•"/>
             </a:pPr>
             <a:r>
-              <a:rPr lang="en-US" sz="1600" dirty="0" smtClean="0">
-                <a:solidFill>
-                  <a:schemeClr val="tx2"/>
-                </a:solidFill>
-              </a:rPr>
-              <a:t>Responsibilities, characteristics, features, </a:t>
-            </a:r>
-            <a:r>
               <a:rPr lang="en-US" sz="1600" dirty="0">
                 <a:solidFill>
                   <a:schemeClr val="tx2"/>
                 </a:solidFill>
               </a:rPr>
-              <a:t>services , capabilities, </a:t>
-            </a:r>
-            <a:r>
-              <a:rPr lang="en-US" sz="1600" dirty="0" smtClean="0">
-                <a:solidFill>
-                  <a:schemeClr val="tx2"/>
-                </a:solidFill>
-              </a:rPr>
-              <a:t>and/</a:t>
-            </a:r>
-            <a:r>
-              <a:rPr lang="en-US" sz="1600" dirty="0" smtClean="0">
-                <a:solidFill>
-                  <a:schemeClr val="tx2"/>
-                </a:solidFill>
-              </a:rPr>
-              <a:t>or </a:t>
-            </a:r>
-            <a:r>
-              <a:rPr lang="en-US" sz="1600" dirty="0" smtClean="0">
-                <a:solidFill>
-                  <a:schemeClr val="tx2"/>
-                </a:solidFill>
-              </a:rPr>
-              <a:t>components?</a:t>
+              <a:t>Responsibilities, characteristics, features, services , capabilities, and/or components?</a:t>
             </a:r>
             <a:br>
-              <a:rPr lang="en-US" sz="1600" dirty="0" smtClean="0">
+              <a:rPr lang="en-US" sz="1600" dirty="0">
                 <a:solidFill>
                   <a:schemeClr val="tx2"/>
                 </a:solidFill>
               </a:rPr>
             </a:br>
-            <a:endParaRPr lang="en-US" sz="1600" dirty="0" smtClean="0">
+            <a:endParaRPr lang="en-US" sz="1600" dirty="0">
               <a:solidFill>
                 <a:schemeClr val="tx2"/>
               </a:solidFill>
             </a:endParaRPr>
           </a:p>
           <a:p>
-            <a:endParaRPr lang="en-US" b="1" dirty="0" smtClean="0">
+            <a:endParaRPr lang="en-US" b="1" dirty="0">
               <a:solidFill>
                 <a:schemeClr val="tx2"/>
               </a:solidFill>
@@ -3519,7 +3442,7 @@
           <a:lstStyle/>
           <a:p>
             <a:r>
-              <a:rPr lang="en-US" b="1" dirty="0" smtClean="0">
+              <a:rPr lang="en-US" b="1" dirty="0">
                 <a:solidFill>
                   <a:schemeClr val="tx2"/>
                 </a:solidFill>
@@ -3527,13 +3450,13 @@
               <a:t>Server = Web server, Application container, Database server</a:t>
             </a:r>
             <a:br>
-              <a:rPr lang="en-US" b="1" dirty="0" smtClean="0">
+              <a:rPr lang="en-US" b="1" dirty="0">
                 <a:solidFill>
                   <a:schemeClr val="tx2"/>
                 </a:solidFill>
               </a:rPr>
             </a:br>
-            <a:endParaRPr lang="en-US" b="1" dirty="0" smtClean="0">
+            <a:endParaRPr lang="en-US" b="1" dirty="0">
               <a:solidFill>
                 <a:schemeClr val="tx2"/>
               </a:solidFill>
@@ -3545,60 +3468,28 @@
               <a:buChar char="•"/>
             </a:pPr>
             <a:r>
-              <a:rPr lang="en-US" sz="1600" dirty="0" smtClean="0">
-                <a:solidFill>
-                  <a:schemeClr val="tx2"/>
-                </a:solidFill>
-              </a:rPr>
-              <a:t>Responsibilities, characteristics, features, </a:t>
-            </a:r>
-            <a:r>
               <a:rPr lang="en-US" sz="1600" dirty="0">
                 <a:solidFill>
                   <a:schemeClr val="tx2"/>
                 </a:solidFill>
               </a:rPr>
-              <a:t>services , capabilities, </a:t>
-            </a:r>
-            <a:r>
-              <a:rPr lang="en-US" sz="1600" dirty="0" smtClean="0">
-                <a:solidFill>
-                  <a:schemeClr val="tx2"/>
-                </a:solidFill>
-              </a:rPr>
-              <a:t>and/</a:t>
-            </a:r>
-            <a:r>
-              <a:rPr lang="en-US" sz="1600" dirty="0" smtClean="0">
-                <a:solidFill>
-                  <a:schemeClr val="tx2"/>
-                </a:solidFill>
-              </a:rPr>
-              <a:t>or </a:t>
-            </a:r>
-            <a:r>
-              <a:rPr lang="en-US" sz="1600" dirty="0" smtClean="0">
-                <a:solidFill>
-                  <a:schemeClr val="tx2"/>
-                </a:solidFill>
-              </a:rPr>
-              <a:t>components?</a:t>
+              <a:t>Responsibilities, characteristics, features, services , capabilities, and/or components?</a:t>
             </a:r>
             <a:br>
-              <a:rPr lang="en-US" sz="1600" dirty="0" smtClean="0">
+              <a:rPr lang="en-US" sz="1600" dirty="0">
                 <a:solidFill>
                   <a:schemeClr val="tx2"/>
                 </a:solidFill>
               </a:rPr>
             </a:br>
-            <a:endParaRPr lang="en-US" sz="1600" dirty="0" smtClean="0">
+            <a:endParaRPr lang="en-US" sz="1600" dirty="0">
               <a:solidFill>
                 <a:schemeClr val="tx2"/>
               </a:solidFill>
             </a:endParaRPr>
           </a:p>
           <a:p>
-            <a:endParaRPr lang="en-US" sz="1600" dirty="0" smtClean="0">
+            <a:endParaRPr lang="en-US" sz="1600" dirty="0">
               <a:solidFill>
                 <a:schemeClr val="tx2"/>
               </a:solidFill>
@@ -3645,7 +3536,13 @@
       </p:sp>
       <p:sp>
         <p:nvSpPr>
-          <p:cNvPr id="11" name="Date Placeholder 3"/>
+          <p:cNvPr id="9" name="Date Placeholder 3">
+            <a:extLst>
+              <a:ext uri="{FF2B5EF4-FFF2-40B4-BE49-F238E27FC236}">
+                <a16:creationId xmlns:a16="http://schemas.microsoft.com/office/drawing/2014/main" id="{B4F0F668-4D41-47B6-86C6-92CA7BF883B1}"/>
+              </a:ext>
+            </a:extLst>
+          </p:cNvPr>
           <p:cNvSpPr>
             <a:spLocks noGrp="1"/>
           </p:cNvSpPr>
@@ -3672,8 +3569,8 @@
           </a:lstStyle>
           <a:p>
             <a:r>
-              <a:rPr lang="fi-FI" dirty="0" smtClean="0"/>
-              <a:t>2017-11-06</a:t>
+              <a:rPr lang="fi-FI" dirty="0"/>
+              <a:t>2020-11-16</a:t>
             </a:r>
             <a:endParaRPr lang="en-US" dirty="0"/>
           </a:p>
@@ -3681,7 +3578,13 @@
       </p:sp>
       <p:sp>
         <p:nvSpPr>
-          <p:cNvPr id="12" name="Footer Placeholder 4"/>
+          <p:cNvPr id="13" name="Footer Placeholder 4">
+            <a:extLst>
+              <a:ext uri="{FF2B5EF4-FFF2-40B4-BE49-F238E27FC236}">
+                <a16:creationId xmlns:a16="http://schemas.microsoft.com/office/drawing/2014/main" id="{FDD9361F-2B60-449A-9FDF-FDAE24D598DA}"/>
+              </a:ext>
+            </a:extLst>
+          </p:cNvPr>
           <p:cNvSpPr>
             <a:spLocks noGrp="1"/>
           </p:cNvSpPr>
@@ -3708,12 +3611,8 @@
           </a:lstStyle>
           <a:p>
             <a:r>
-              <a:rPr lang="fi-FI" dirty="0" smtClean="0"/>
-              <a:t>© Juhani </a:t>
-            </a:r>
-            <a:r>
-              <a:rPr lang="fi-FI" dirty="0" smtClean="0"/>
-              <a:t>Välimäki 2012-2017</a:t>
+              <a:rPr lang="fi-FI" dirty="0"/>
+              <a:t>© Juhani Välimäki 2012-2020</a:t>
             </a:r>
             <a:endParaRPr lang="en-US" dirty="0"/>
           </a:p>
@@ -3729,13 +3628,6 @@
   <p:clrMapOvr>
     <a:masterClrMapping/>
   </p:clrMapOvr>
-  <p:timing>
-    <p:tnLst>
-      <p:par>
-        <p:cTn id="1" dur="indefinite" restart="never" nodeType="tmRoot"/>
-      </p:par>
-    </p:tnLst>
-  </p:timing>
 </p:sld>
 </file>
 
@@ -3793,37 +3685,21 @@
           <a:lstStyle/>
           <a:p>
             <a:r>
-              <a:rPr lang="en-US" b="1" dirty="0" smtClean="0">
-                <a:solidFill>
-                  <a:schemeClr val="tx2"/>
-                </a:solidFill>
-              </a:rPr>
-              <a:t>Client = </a:t>
-            </a:r>
-            <a:r>
-              <a:rPr lang="en-US" b="1" dirty="0" smtClean="0">
-                <a:solidFill>
-                  <a:schemeClr val="tx2"/>
-                </a:solidFill>
-              </a:rPr>
-              <a:t>Browser and front-end application</a:t>
-            </a:r>
-            <a:r>
-              <a:rPr lang="en-US" b="1" dirty="0" smtClean="0">
-                <a:solidFill>
-                  <a:schemeClr val="tx2"/>
-                </a:solidFill>
-              </a:rPr>
-              <a:t/>
+              <a:rPr lang="en-US" b="1" dirty="0">
+                <a:solidFill>
+                  <a:schemeClr val="tx2"/>
+                </a:solidFill>
+              </a:rPr>
+              <a:t>Client = Browser and front-end application</a:t>
             </a:r>
             <a:br>
-              <a:rPr lang="en-US" b="1" dirty="0" smtClean="0">
+              <a:rPr lang="en-US" b="1" dirty="0">
                 <a:solidFill>
                   <a:schemeClr val="tx2"/>
                 </a:solidFill>
               </a:rPr>
             </a:br>
-            <a:endParaRPr lang="en-US" b="1" dirty="0" smtClean="0">
+            <a:endParaRPr lang="en-US" b="1" dirty="0">
               <a:solidFill>
                 <a:schemeClr val="tx2"/>
               </a:solidFill>
@@ -3835,7 +3711,7 @@
               <a:buChar char="•"/>
             </a:pPr>
             <a:r>
-              <a:rPr lang="en-US" sz="1600" dirty="0" smtClean="0">
+              <a:rPr lang="en-US" sz="1600" dirty="0">
                 <a:solidFill>
                   <a:schemeClr val="tx2"/>
                 </a:solidFill>
@@ -3849,12 +3725,12 @@
               <a:buChar char="•"/>
             </a:pPr>
             <a:r>
-              <a:rPr lang="en-US" sz="1600" dirty="0" smtClean="0">
-                <a:solidFill>
-                  <a:schemeClr val="tx2"/>
-                </a:solidFill>
-              </a:rPr>
-              <a:t>Parses and renders HTML, CSS</a:t>
+              <a:rPr lang="en-US" sz="1600" dirty="0">
+                <a:solidFill>
+                  <a:schemeClr val="tx2"/>
+                </a:solidFill>
+              </a:rPr>
+              <a:t>Parses and renders DOM: HTML, CSS, JS</a:t>
             </a:r>
           </a:p>
           <a:p>
@@ -3863,54 +3739,14 @@
               <a:buChar char="•"/>
             </a:pPr>
             <a:r>
-              <a:rPr lang="fi-FI" sz="1600" dirty="0" err="1" smtClean="0">
-                <a:solidFill>
-                  <a:schemeClr val="tx2"/>
-                </a:solidFill>
-              </a:rPr>
-              <a:t>Downloads</a:t>
-            </a:r>
-            <a:r>
-              <a:rPr lang="fi-FI" sz="1600" dirty="0" smtClean="0">
-                <a:solidFill>
-                  <a:schemeClr val="tx2"/>
-                </a:solidFill>
-              </a:rPr>
-              <a:t> and </a:t>
-            </a:r>
-            <a:r>
-              <a:rPr lang="fi-FI" sz="1600" dirty="0" err="1" smtClean="0">
-                <a:solidFill>
-                  <a:schemeClr val="tx2"/>
-                </a:solidFill>
-              </a:rPr>
-              <a:t>shows</a:t>
-            </a:r>
-            <a:r>
-              <a:rPr lang="fi-FI" sz="1600" dirty="0" smtClean="0">
-                <a:solidFill>
-                  <a:schemeClr val="tx2"/>
-                </a:solidFill>
-              </a:rPr>
-              <a:t> </a:t>
-            </a:r>
-            <a:r>
-              <a:rPr lang="fi-FI" sz="1600" dirty="0" err="1" smtClean="0">
-                <a:solidFill>
-                  <a:schemeClr val="tx2"/>
-                </a:solidFill>
-              </a:rPr>
-              <a:t>images</a:t>
-            </a:r>
-            <a:r>
-              <a:rPr lang="fi-FI" sz="1600" dirty="0" smtClean="0">
-                <a:solidFill>
-                  <a:schemeClr val="tx2"/>
-                </a:solidFill>
-              </a:rPr>
-              <a:t> and media</a:t>
-            </a:r>
-            <a:endParaRPr lang="en-US" sz="1600" dirty="0" smtClean="0">
+              <a:rPr lang="fi-FI" sz="1600" dirty="0">
+                <a:solidFill>
+                  <a:schemeClr val="tx2"/>
+                </a:solidFill>
+              </a:rPr>
+              <a:t>Downloads and shows images and media</a:t>
+            </a:r>
+            <a:endParaRPr lang="en-US" sz="1600" dirty="0">
               <a:solidFill>
                 <a:schemeClr val="tx2"/>
               </a:solidFill>
@@ -3922,12 +3758,12 @@
               <a:buChar char="•"/>
             </a:pPr>
             <a:r>
-              <a:rPr lang="en-US" sz="1600" dirty="0" smtClean="0">
-                <a:solidFill>
-                  <a:schemeClr val="tx2"/>
-                </a:solidFill>
-              </a:rPr>
-              <a:t>Maintains the DOM</a:t>
+              <a:rPr lang="en-US" sz="1600" dirty="0">
+                <a:solidFill>
+                  <a:schemeClr val="tx2"/>
+                </a:solidFill>
+              </a:rPr>
+              <a:t>Provides UI for navigation (links, etc.)</a:t>
             </a:r>
           </a:p>
           <a:p>
@@ -3936,46 +3772,124 @@
               <a:buChar char="•"/>
             </a:pPr>
             <a:r>
-              <a:rPr lang="en-US" sz="1600" dirty="0" smtClean="0">
-                <a:solidFill>
-                  <a:schemeClr val="tx2"/>
-                </a:solidFill>
-              </a:rPr>
-              <a:t>Provides </a:t>
-            </a:r>
-            <a:r>
-              <a:rPr lang="en-US" sz="1600" dirty="0" smtClean="0">
-                <a:solidFill>
-                  <a:schemeClr val="tx2"/>
-                </a:solidFill>
-              </a:rPr>
-              <a:t>UI</a:t>
-            </a:r>
-            <a:r>
-              <a:rPr lang="en-US" sz="1600" dirty="0" smtClean="0">
-                <a:solidFill>
-                  <a:schemeClr val="tx2"/>
-                </a:solidFill>
-              </a:rPr>
-              <a:t> </a:t>
-            </a:r>
-            <a:r>
-              <a:rPr lang="en-US" sz="1600" dirty="0" smtClean="0">
-                <a:solidFill>
-                  <a:schemeClr val="tx2"/>
-                </a:solidFill>
-              </a:rPr>
-              <a:t>for </a:t>
-            </a:r>
-            <a:r>
-              <a:rPr lang="en-US" sz="1600" dirty="0" smtClean="0">
-                <a:solidFill>
-                  <a:schemeClr val="tx2"/>
-                </a:solidFill>
-              </a:rPr>
-              <a:t>navigation (links, etc.)</a:t>
-            </a:r>
-            <a:endParaRPr lang="en-US" sz="1600" dirty="0" smtClean="0">
+              <a:rPr lang="en-US" sz="1600" dirty="0">
+                <a:solidFill>
+                  <a:schemeClr val="tx2"/>
+                </a:solidFill>
+              </a:rPr>
+              <a:t>Possible SPA Routing between “Pages”</a:t>
+            </a:r>
+          </a:p>
+          <a:p>
+            <a:pPr marL="285750" indent="-285750">
+              <a:buFont typeface="Arial" panose="020B0604020202020204" pitchFamily="34" charset="0"/>
+              <a:buChar char="•"/>
+            </a:pPr>
+            <a:r>
+              <a:rPr lang="en-US" sz="1600" dirty="0">
+                <a:solidFill>
+                  <a:schemeClr val="tx2"/>
+                </a:solidFill>
+              </a:rPr>
+              <a:t>Provides form controls and form submissions (usually HTTP POST)</a:t>
+            </a:r>
+          </a:p>
+          <a:p>
+            <a:pPr marL="285750" indent="-285750">
+              <a:buFont typeface="Arial" panose="020B0604020202020204" pitchFamily="34" charset="0"/>
+              <a:buChar char="•"/>
+            </a:pPr>
+            <a:r>
+              <a:rPr lang="en-US" sz="1600" dirty="0">
+                <a:solidFill>
+                  <a:schemeClr val="tx2"/>
+                </a:solidFill>
+              </a:rPr>
+              <a:t>UI event handling, like mouse dragging etc.</a:t>
+            </a:r>
+          </a:p>
+          <a:p>
+            <a:pPr marL="285750" indent="-285750">
+              <a:buFont typeface="Arial" panose="020B0604020202020204" pitchFamily="34" charset="0"/>
+              <a:buChar char="•"/>
+            </a:pPr>
+            <a:r>
+              <a:rPr lang="en-US" sz="1600" dirty="0">
+                <a:solidFill>
+                  <a:schemeClr val="tx2"/>
+                </a:solidFill>
+              </a:rPr>
+              <a:t>Runs JavaScript</a:t>
+            </a:r>
+          </a:p>
+          <a:p>
+            <a:pPr marL="285750" indent="-285750">
+              <a:buFont typeface="Arial" panose="020B0604020202020204" pitchFamily="34" charset="0"/>
+              <a:buChar char="•"/>
+            </a:pPr>
+            <a:r>
+              <a:rPr lang="en-US" sz="1600" dirty="0">
+                <a:solidFill>
+                  <a:schemeClr val="tx2"/>
+                </a:solidFill>
+              </a:rPr>
+              <a:t>Runs AJAX request </a:t>
+            </a:r>
+            <a:r>
+              <a:rPr lang="en-US" sz="1600">
+                <a:solidFill>
+                  <a:schemeClr val="tx2"/>
+                </a:solidFill>
+              </a:rPr>
+              <a:t>and receives </a:t>
+            </a:r>
+            <a:r>
+              <a:rPr lang="en-US" sz="1600" dirty="0">
+                <a:solidFill>
+                  <a:schemeClr val="tx2"/>
+                </a:solidFill>
+              </a:rPr>
+              <a:t>responses</a:t>
+            </a:r>
+          </a:p>
+          <a:p>
+            <a:pPr marL="285750" indent="-285750">
+              <a:buFont typeface="Arial" panose="020B0604020202020204" pitchFamily="34" charset="0"/>
+              <a:buChar char="•"/>
+            </a:pPr>
+            <a:r>
+              <a:rPr lang="fi-FI" sz="1600" dirty="0" err="1">
+                <a:solidFill>
+                  <a:schemeClr val="tx2"/>
+                </a:solidFill>
+              </a:rPr>
+              <a:t>Validation</a:t>
+            </a:r>
+            <a:r>
+              <a:rPr lang="fi-FI" sz="1600" dirty="0">
+                <a:solidFill>
+                  <a:schemeClr val="tx2"/>
+                </a:solidFill>
+              </a:rPr>
+              <a:t> of input (</a:t>
+            </a:r>
+            <a:r>
+              <a:rPr lang="fi-FI" sz="1600" dirty="0" err="1">
+                <a:solidFill>
+                  <a:schemeClr val="tx2"/>
+                </a:solidFill>
+              </a:rPr>
+              <a:t>client</a:t>
+            </a:r>
+            <a:r>
+              <a:rPr lang="fi-FI" sz="1600" dirty="0">
+                <a:solidFill>
+                  <a:schemeClr val="tx2"/>
+                </a:solidFill>
+              </a:rPr>
+              <a:t>-side)</a:t>
+            </a:r>
+            <a:endParaRPr lang="en-US" sz="1600" dirty="0">
               <a:solidFill>
                 <a:schemeClr val="tx2"/>
               </a:solidFill>
@@ -3987,20 +3901,28 @@
               <a:buChar char="•"/>
             </a:pPr>
             <a:r>
-              <a:rPr lang="en-US" sz="1600" dirty="0" smtClean="0">
-                <a:solidFill>
-                  <a:schemeClr val="tx2"/>
-                </a:solidFill>
-              </a:rPr>
-              <a:t>Provides form controls and form submissions (usually HTTP POST</a:t>
-            </a:r>
-            <a:r>
-              <a:rPr lang="en-US" sz="1600" dirty="0" smtClean="0">
-                <a:solidFill>
-                  <a:schemeClr val="tx2"/>
-                </a:solidFill>
-              </a:rPr>
-              <a:t>)</a:t>
+              <a:rPr lang="fi-FI" sz="1600" dirty="0">
+                <a:solidFill>
+                  <a:schemeClr val="tx2"/>
+                </a:solidFill>
+              </a:rPr>
+              <a:t>Session management (</a:t>
+            </a:r>
+            <a:r>
+              <a:rPr lang="fi-FI" sz="1600" dirty="0" err="1">
+                <a:solidFill>
+                  <a:schemeClr val="tx2"/>
+                </a:solidFill>
+              </a:rPr>
+              <a:t>client</a:t>
+            </a:r>
+            <a:r>
+              <a:rPr lang="fi-FI" sz="1600" dirty="0">
+                <a:solidFill>
+                  <a:schemeClr val="tx2"/>
+                </a:solidFill>
+              </a:rPr>
+              <a:t>-side)</a:t>
             </a:r>
           </a:p>
           <a:p>
@@ -4009,14 +3931,22 @@
               <a:buChar char="•"/>
             </a:pPr>
             <a:r>
-              <a:rPr lang="en-US" sz="1600" dirty="0" smtClean="0">
-                <a:solidFill>
-                  <a:schemeClr val="tx2"/>
-                </a:solidFill>
-              </a:rPr>
-              <a:t>UI event handling, like mouse dragging etc.</a:t>
-            </a:r>
-            <a:endParaRPr lang="en-US" sz="1600" dirty="0" smtClean="0">
+              <a:rPr lang="fi-FI" sz="1600" dirty="0">
+                <a:solidFill>
+                  <a:schemeClr val="tx2"/>
+                </a:solidFill>
+              </a:rPr>
+              <a:t>Saves </a:t>
+            </a:r>
+            <a:r>
+              <a:rPr lang="fi-FI" sz="1600" dirty="0" err="1">
+                <a:solidFill>
+                  <a:schemeClr val="tx2"/>
+                </a:solidFill>
+              </a:rPr>
+              <a:t>cookies</a:t>
+            </a:r>
+            <a:endParaRPr lang="fi-FI" sz="1600" dirty="0">
               <a:solidFill>
                 <a:schemeClr val="tx2"/>
               </a:solidFill>
@@ -4028,12 +3958,68 @@
               <a:buChar char="•"/>
             </a:pPr>
             <a:r>
-              <a:rPr lang="en-US" sz="1600" dirty="0" smtClean="0">
-                <a:solidFill>
-                  <a:schemeClr val="tx2"/>
-                </a:solidFill>
-              </a:rPr>
-              <a:t>Runs JavaScript</a:t>
+              <a:rPr lang="fi-FI" sz="1600" dirty="0" err="1">
+                <a:solidFill>
+                  <a:schemeClr val="tx2"/>
+                </a:solidFill>
+              </a:rPr>
+              <a:t>Caching</a:t>
+            </a:r>
+            <a:r>
+              <a:rPr lang="fi-FI" sz="1600" dirty="0">
+                <a:solidFill>
+                  <a:schemeClr val="tx2"/>
+                </a:solidFill>
+              </a:rPr>
+              <a:t>. And </a:t>
+            </a:r>
+            <a:r>
+              <a:rPr lang="fi-FI" sz="1600" dirty="0" err="1">
+                <a:solidFill>
+                  <a:schemeClr val="tx2"/>
+                </a:solidFill>
+              </a:rPr>
+              <a:t>Local</a:t>
+            </a:r>
+            <a:r>
+              <a:rPr lang="fi-FI" sz="1600" dirty="0">
+                <a:solidFill>
+                  <a:schemeClr val="tx2"/>
+                </a:solidFill>
+              </a:rPr>
+              <a:t> </a:t>
+            </a:r>
+            <a:r>
+              <a:rPr lang="fi-FI" sz="1600" dirty="0" err="1">
+                <a:solidFill>
+                  <a:schemeClr val="tx2"/>
+                </a:solidFill>
+              </a:rPr>
+              <a:t>storage</a:t>
+            </a:r>
+            <a:r>
+              <a:rPr lang="fi-FI" sz="1600" dirty="0">
+                <a:solidFill>
+                  <a:schemeClr val="tx2"/>
+                </a:solidFill>
+              </a:rPr>
+              <a:t>. </a:t>
+            </a:r>
+            <a:r>
+              <a:rPr lang="fi-FI" sz="1600" dirty="0" err="1">
+                <a:solidFill>
+                  <a:schemeClr val="tx2"/>
+                </a:solidFill>
+              </a:rPr>
+              <a:t>Debugger</a:t>
+            </a:r>
+            <a:r>
+              <a:rPr lang="fi-FI" sz="1600" dirty="0">
+                <a:solidFill>
+                  <a:schemeClr val="tx2"/>
+                </a:solidFill>
+              </a:rPr>
+              <a:t>.</a:t>
             </a:r>
           </a:p>
           <a:p>
@@ -4042,13 +4028,90 @@
               <a:buChar char="•"/>
             </a:pPr>
             <a:r>
-              <a:rPr lang="en-US" sz="1600" dirty="0" smtClean="0">
-                <a:solidFill>
-                  <a:schemeClr val="tx2"/>
-                </a:solidFill>
-              </a:rPr>
-              <a:t>Runs AJAX request/responses too</a:t>
-            </a:r>
+              <a:rPr lang="fi-FI" sz="1600" dirty="0">
+                <a:solidFill>
+                  <a:schemeClr val="tx2"/>
+                </a:solidFill>
+              </a:rPr>
+              <a:t>Can </a:t>
+            </a:r>
+            <a:r>
+              <a:rPr lang="fi-FI" sz="1600" dirty="0" err="1">
+                <a:solidFill>
+                  <a:schemeClr val="tx2"/>
+                </a:solidFill>
+              </a:rPr>
+              <a:t>fetch</a:t>
+            </a:r>
+            <a:r>
+              <a:rPr lang="fi-FI" sz="1600" dirty="0">
+                <a:solidFill>
+                  <a:schemeClr val="tx2"/>
+                </a:solidFill>
+              </a:rPr>
+              <a:t> </a:t>
+            </a:r>
+            <a:r>
+              <a:rPr lang="fi-FI" sz="1600" dirty="0" err="1">
+                <a:solidFill>
+                  <a:schemeClr val="tx2"/>
+                </a:solidFill>
+              </a:rPr>
+              <a:t>content</a:t>
+            </a:r>
+            <a:r>
+              <a:rPr lang="fi-FI" sz="1600" dirty="0">
+                <a:solidFill>
+                  <a:schemeClr val="tx2"/>
+                </a:solidFill>
+              </a:rPr>
+              <a:t> </a:t>
+            </a:r>
+            <a:r>
+              <a:rPr lang="fi-FI" sz="1600" dirty="0" err="1">
+                <a:solidFill>
+                  <a:schemeClr val="tx2"/>
+                </a:solidFill>
+              </a:rPr>
+              <a:t>from</a:t>
+            </a:r>
+            <a:r>
+              <a:rPr lang="fi-FI" sz="1600" dirty="0">
+                <a:solidFill>
+                  <a:schemeClr val="tx2"/>
+                </a:solidFill>
+              </a:rPr>
+              <a:t> </a:t>
+            </a:r>
+            <a:r>
+              <a:rPr lang="fi-FI" sz="1600" dirty="0" err="1">
+                <a:solidFill>
+                  <a:schemeClr val="tx2"/>
+                </a:solidFill>
+              </a:rPr>
+              <a:t>many</a:t>
+            </a:r>
+            <a:r>
+              <a:rPr lang="fi-FI" sz="1600" dirty="0">
+                <a:solidFill>
+                  <a:schemeClr val="tx2"/>
+                </a:solidFill>
+              </a:rPr>
+              <a:t> </a:t>
+            </a:r>
+            <a:r>
+              <a:rPr lang="fi-FI" sz="1600" dirty="0" err="1">
+                <a:solidFill>
+                  <a:schemeClr val="tx2"/>
+                </a:solidFill>
+              </a:rPr>
+              <a:t>servers</a:t>
+            </a:r>
+            <a:endParaRPr lang="fi-FI" sz="1600" dirty="0">
+              <a:solidFill>
+                <a:schemeClr val="tx2"/>
+              </a:solidFill>
+            </a:endParaRPr>
           </a:p>
           <a:p>
             <a:pPr marL="285750" indent="-285750">
@@ -4056,23 +4119,333 @@
               <a:buChar char="•"/>
             </a:pPr>
             <a:r>
-              <a:rPr lang="fi-FI" sz="1600" dirty="0" err="1" smtClean="0">
-                <a:solidFill>
-                  <a:schemeClr val="tx2"/>
-                </a:solidFill>
-              </a:rPr>
-              <a:t>Validation</a:t>
-            </a:r>
-            <a:r>
-              <a:rPr lang="fi-FI" sz="1600" dirty="0" smtClean="0">
-                <a:solidFill>
-                  <a:schemeClr val="tx2"/>
-                </a:solidFill>
-              </a:rPr>
-              <a:t> of input (</a:t>
-            </a:r>
-            <a:r>
-              <a:rPr lang="fi-FI" sz="1600" dirty="0" err="1" smtClean="0">
+              <a:rPr lang="fi-FI" sz="1600" dirty="0" err="1">
+                <a:solidFill>
+                  <a:schemeClr val="tx2"/>
+                </a:solidFill>
+              </a:rPr>
+              <a:t>Maintains</a:t>
+            </a:r>
+            <a:r>
+              <a:rPr lang="fi-FI" sz="1600" dirty="0">
+                <a:solidFill>
+                  <a:schemeClr val="tx2"/>
+                </a:solidFill>
+              </a:rPr>
+              <a:t> </a:t>
+            </a:r>
+            <a:r>
+              <a:rPr lang="fi-FI" sz="1600" dirty="0" err="1">
+                <a:solidFill>
+                  <a:schemeClr val="tx2"/>
+                </a:solidFill>
+              </a:rPr>
+              <a:t>hidden</a:t>
+            </a:r>
+            <a:r>
+              <a:rPr lang="fi-FI" sz="1600" dirty="0">
+                <a:solidFill>
+                  <a:schemeClr val="tx2"/>
+                </a:solidFill>
+              </a:rPr>
+              <a:t> info </a:t>
+            </a:r>
+            <a:r>
+              <a:rPr lang="fi-FI" sz="1600" dirty="0" err="1">
+                <a:solidFill>
+                  <a:schemeClr val="tx2"/>
+                </a:solidFill>
+              </a:rPr>
+              <a:t>sent</a:t>
+            </a:r>
+            <a:r>
+              <a:rPr lang="fi-FI" sz="1600" dirty="0">
+                <a:solidFill>
+                  <a:schemeClr val="tx2"/>
+                </a:solidFill>
+              </a:rPr>
+              <a:t> and </a:t>
+            </a:r>
+            <a:r>
+              <a:rPr lang="fi-FI" sz="1600" dirty="0" err="1">
+                <a:solidFill>
+                  <a:schemeClr val="tx2"/>
+                </a:solidFill>
+              </a:rPr>
+              <a:t>later</a:t>
+            </a:r>
+            <a:r>
+              <a:rPr lang="fi-FI" sz="1600" dirty="0">
+                <a:solidFill>
+                  <a:schemeClr val="tx2"/>
+                </a:solidFill>
+              </a:rPr>
+              <a:t> </a:t>
+            </a:r>
+            <a:r>
+              <a:rPr lang="fi-FI" sz="1600" dirty="0" err="1">
+                <a:solidFill>
+                  <a:schemeClr val="tx2"/>
+                </a:solidFill>
+              </a:rPr>
+              <a:t>again</a:t>
+            </a:r>
+            <a:r>
+              <a:rPr lang="fi-FI" sz="1600" dirty="0">
+                <a:solidFill>
+                  <a:schemeClr val="tx2"/>
+                </a:solidFill>
+              </a:rPr>
+              <a:t> </a:t>
+            </a:r>
+            <a:r>
+              <a:rPr lang="fi-FI" sz="1600" dirty="0" err="1">
+                <a:solidFill>
+                  <a:schemeClr val="tx2"/>
+                </a:solidFill>
+              </a:rPr>
+              <a:t>accessed</a:t>
+            </a:r>
+            <a:r>
+              <a:rPr lang="fi-FI" sz="1600" dirty="0">
+                <a:solidFill>
+                  <a:schemeClr val="tx2"/>
+                </a:solidFill>
+              </a:rPr>
+              <a:t> </a:t>
+            </a:r>
+            <a:r>
+              <a:rPr lang="fi-FI" sz="1600" dirty="0" err="1">
+                <a:solidFill>
+                  <a:schemeClr val="tx2"/>
+                </a:solidFill>
+              </a:rPr>
+              <a:t>by</a:t>
+            </a:r>
+            <a:r>
+              <a:rPr lang="fi-FI" sz="1600" dirty="0">
+                <a:solidFill>
+                  <a:schemeClr val="tx2"/>
+                </a:solidFill>
+              </a:rPr>
+              <a:t> </a:t>
+            </a:r>
+            <a:r>
+              <a:rPr lang="fi-FI" sz="1600" dirty="0" err="1">
+                <a:solidFill>
+                  <a:schemeClr val="tx2"/>
+                </a:solidFill>
+              </a:rPr>
+              <a:t>the</a:t>
+            </a:r>
+            <a:r>
+              <a:rPr lang="fi-FI" sz="1600" dirty="0">
+                <a:solidFill>
+                  <a:schemeClr val="tx2"/>
+                </a:solidFill>
+              </a:rPr>
+              <a:t> </a:t>
+            </a:r>
+            <a:r>
+              <a:rPr lang="fi-FI" sz="1600" dirty="0" err="1">
+                <a:solidFill>
+                  <a:schemeClr val="tx2"/>
+                </a:solidFill>
+              </a:rPr>
+              <a:t>server</a:t>
+            </a:r>
+            <a:r>
+              <a:rPr lang="fi-FI" sz="1600" dirty="0">
+                <a:solidFill>
+                  <a:schemeClr val="tx2"/>
+                </a:solidFill>
+              </a:rPr>
+              <a:t>, </a:t>
+            </a:r>
+            <a:r>
+              <a:rPr lang="fi-FI" sz="1600" dirty="0" err="1">
+                <a:solidFill>
+                  <a:schemeClr val="tx2"/>
+                </a:solidFill>
+              </a:rPr>
+              <a:t>usually</a:t>
+            </a:r>
+            <a:r>
+              <a:rPr lang="fi-FI" sz="1600" dirty="0">
+                <a:solidFill>
+                  <a:schemeClr val="tx2"/>
+                </a:solidFill>
+              </a:rPr>
+              <a:t> </a:t>
+            </a:r>
+            <a:r>
+              <a:rPr lang="fi-FI" sz="1600" dirty="0" err="1">
+                <a:solidFill>
+                  <a:schemeClr val="tx2"/>
+                </a:solidFill>
+              </a:rPr>
+              <a:t>encrypted</a:t>
+            </a:r>
+            <a:r>
+              <a:rPr lang="fi-FI" sz="1600" dirty="0">
+                <a:solidFill>
+                  <a:schemeClr val="tx2"/>
+                </a:solidFill>
+              </a:rPr>
+              <a:t>, (</a:t>
+            </a:r>
+            <a:r>
+              <a:rPr lang="fi-FI" sz="1600" dirty="0" err="1">
+                <a:solidFill>
+                  <a:schemeClr val="tx2"/>
+                </a:solidFill>
+              </a:rPr>
+              <a:t>like</a:t>
+            </a:r>
+            <a:r>
+              <a:rPr lang="fi-FI" sz="1600" dirty="0">
+                <a:solidFill>
+                  <a:schemeClr val="tx2"/>
+                </a:solidFill>
+              </a:rPr>
+              <a:t> </a:t>
+            </a:r>
+            <a:r>
+              <a:rPr lang="fi-FI" sz="1600" dirty="0" err="1">
+                <a:solidFill>
+                  <a:schemeClr val="tx2"/>
+                </a:solidFill>
+              </a:rPr>
+              <a:t>antiforgerytokens</a:t>
+            </a:r>
+            <a:r>
+              <a:rPr lang="fi-FI" sz="1600" dirty="0">
+                <a:solidFill>
+                  <a:schemeClr val="tx2"/>
+                </a:solidFill>
+              </a:rPr>
+              <a:t>, </a:t>
+            </a:r>
+            <a:r>
+              <a:rPr lang="fi-FI" sz="1600" dirty="0" err="1">
+                <a:solidFill>
+                  <a:schemeClr val="tx2"/>
+                </a:solidFill>
+              </a:rPr>
+              <a:t>auth_key</a:t>
+            </a:r>
+            <a:r>
+              <a:rPr lang="fi-FI" sz="1600" dirty="0">
+                <a:solidFill>
+                  <a:schemeClr val="tx2"/>
+                </a:solidFill>
+              </a:rPr>
+              <a:t>, </a:t>
+            </a:r>
+            <a:r>
+              <a:rPr lang="fi-FI" sz="1600" dirty="0" err="1">
+                <a:solidFill>
+                  <a:schemeClr val="tx2"/>
+                </a:solidFill>
+              </a:rPr>
+              <a:t>api_key</a:t>
+            </a:r>
+            <a:r>
+              <a:rPr lang="fi-FI" sz="1600" dirty="0">
+                <a:solidFill>
+                  <a:schemeClr val="tx2"/>
+                </a:solidFill>
+              </a:rPr>
+              <a:t>) and </a:t>
+            </a:r>
+            <a:r>
+              <a:rPr lang="fi-FI" sz="1600" dirty="0" err="1">
+                <a:solidFill>
+                  <a:schemeClr val="tx2"/>
+                </a:solidFill>
+              </a:rPr>
+              <a:t>so</a:t>
+            </a:r>
+            <a:r>
+              <a:rPr lang="fi-FI" sz="1600" dirty="0">
+                <a:solidFill>
+                  <a:schemeClr val="tx2"/>
+                </a:solidFill>
+              </a:rPr>
+              <a:t> on.</a:t>
+            </a:r>
+          </a:p>
+          <a:p>
+            <a:pPr marL="285750" indent="-285750">
+              <a:buFont typeface="Arial" panose="020B0604020202020204" pitchFamily="34" charset="0"/>
+              <a:buChar char="•"/>
+            </a:pPr>
+            <a:r>
+              <a:rPr lang="fi-FI" sz="1600" dirty="0" err="1">
+                <a:solidFill>
+                  <a:schemeClr val="tx2"/>
+                </a:solidFill>
+              </a:rPr>
+              <a:t>Support</a:t>
+            </a:r>
+            <a:r>
+              <a:rPr lang="fi-FI" sz="1600" dirty="0">
+                <a:solidFill>
+                  <a:schemeClr val="tx2"/>
+                </a:solidFill>
+              </a:rPr>
+              <a:t> for </a:t>
+            </a:r>
+            <a:r>
+              <a:rPr lang="fi-FI" sz="1600" dirty="0" err="1">
+                <a:solidFill>
+                  <a:schemeClr val="tx2"/>
+                </a:solidFill>
+              </a:rPr>
+              <a:t>the</a:t>
+            </a:r>
+            <a:r>
+              <a:rPr lang="fi-FI" sz="1600" dirty="0">
+                <a:solidFill>
+                  <a:schemeClr val="tx2"/>
+                </a:solidFill>
+              </a:rPr>
+              <a:t> </a:t>
+            </a:r>
+            <a:r>
+              <a:rPr lang="fi-FI" sz="1600" dirty="0" err="1">
+                <a:solidFill>
+                  <a:schemeClr val="tx2"/>
+                </a:solidFill>
+              </a:rPr>
+              <a:t>carrier</a:t>
+            </a:r>
+            <a:r>
+              <a:rPr lang="fi-FI" sz="1600" dirty="0">
+                <a:solidFill>
+                  <a:schemeClr val="tx2"/>
+                </a:solidFill>
+              </a:rPr>
+              <a:t> </a:t>
+            </a:r>
+            <a:r>
+              <a:rPr lang="fi-FI" sz="1600" dirty="0" err="1">
+                <a:solidFill>
+                  <a:schemeClr val="tx2"/>
+                </a:solidFill>
+              </a:rPr>
+              <a:t>security</a:t>
+            </a:r>
+            <a:r>
+              <a:rPr lang="fi-FI" sz="1600" dirty="0">
+                <a:solidFill>
+                  <a:schemeClr val="tx2"/>
+                </a:solidFill>
+              </a:rPr>
+              <a:t> (</a:t>
+            </a:r>
+            <a:r>
+              <a:rPr lang="fi-FI" sz="1600" dirty="0" err="1">
                 <a:solidFill>
                   <a:schemeClr val="tx2"/>
                 </a:solidFill>
@@ -4080,625 +4453,23 @@
               <a:t>client</a:t>
             </a:r>
             <a:r>
-              <a:rPr lang="fi-FI" sz="1600" dirty="0" smtClean="0">
+              <a:rPr lang="fi-FI" sz="1600" dirty="0">
                 <a:solidFill>
                   <a:schemeClr val="tx2"/>
                 </a:solidFill>
               </a:rPr>
               <a:t>-side)</a:t>
             </a:r>
-            <a:endParaRPr lang="en-US" sz="1600" dirty="0" smtClean="0">
+          </a:p>
+          <a:p>
+            <a:endParaRPr lang="en-US" sz="1600" dirty="0">
               <a:solidFill>
                 <a:schemeClr val="tx2"/>
               </a:solidFill>
             </a:endParaRPr>
           </a:p>
           <a:p>
-            <a:pPr marL="285750" indent="-285750">
-              <a:buFont typeface="Arial" panose="020B0604020202020204" pitchFamily="34" charset="0"/>
-              <a:buChar char="•"/>
-            </a:pPr>
-            <a:r>
-              <a:rPr lang="fi-FI" sz="1600" dirty="0" smtClean="0">
-                <a:solidFill>
-                  <a:schemeClr val="tx2"/>
-                </a:solidFill>
-              </a:rPr>
-              <a:t>Session management (</a:t>
-            </a:r>
-            <a:r>
-              <a:rPr lang="fi-FI" sz="1600" dirty="0" err="1" smtClean="0">
-                <a:solidFill>
-                  <a:schemeClr val="tx2"/>
-                </a:solidFill>
-              </a:rPr>
-              <a:t>client</a:t>
-            </a:r>
-            <a:r>
-              <a:rPr lang="fi-FI" sz="1600" dirty="0" smtClean="0">
-                <a:solidFill>
-                  <a:schemeClr val="tx2"/>
-                </a:solidFill>
-              </a:rPr>
-              <a:t>-side)</a:t>
-            </a:r>
-            <a:endParaRPr lang="fi-FI" sz="1600" dirty="0" smtClean="0">
-              <a:solidFill>
-                <a:schemeClr val="tx2"/>
-              </a:solidFill>
-            </a:endParaRPr>
-          </a:p>
-          <a:p>
-            <a:pPr marL="285750" indent="-285750">
-              <a:buFont typeface="Arial" panose="020B0604020202020204" pitchFamily="34" charset="0"/>
-              <a:buChar char="•"/>
-            </a:pPr>
-            <a:r>
-              <a:rPr lang="fi-FI" sz="1600" dirty="0" smtClean="0">
-                <a:solidFill>
-                  <a:schemeClr val="tx2"/>
-                </a:solidFill>
-              </a:rPr>
-              <a:t>Saves </a:t>
-            </a:r>
-            <a:r>
-              <a:rPr lang="fi-FI" sz="1600" dirty="0" err="1" smtClean="0">
-                <a:solidFill>
-                  <a:schemeClr val="tx2"/>
-                </a:solidFill>
-              </a:rPr>
-              <a:t>cookies</a:t>
-            </a:r>
-            <a:endParaRPr lang="fi-FI" sz="1600" dirty="0" smtClean="0">
-              <a:solidFill>
-                <a:schemeClr val="tx2"/>
-              </a:solidFill>
-            </a:endParaRPr>
-          </a:p>
-          <a:p>
-            <a:pPr marL="285750" indent="-285750">
-              <a:buFont typeface="Arial" panose="020B0604020202020204" pitchFamily="34" charset="0"/>
-              <a:buChar char="•"/>
-            </a:pPr>
-            <a:r>
-              <a:rPr lang="fi-FI" sz="1600" dirty="0" err="1" smtClean="0">
-                <a:solidFill>
-                  <a:schemeClr val="tx2"/>
-                </a:solidFill>
-              </a:rPr>
-              <a:t>Caching</a:t>
-            </a:r>
-            <a:r>
-              <a:rPr lang="fi-FI" sz="1600" dirty="0" smtClean="0">
-                <a:solidFill>
-                  <a:schemeClr val="tx2"/>
-                </a:solidFill>
-              </a:rPr>
-              <a:t>. And </a:t>
-            </a:r>
-            <a:r>
-              <a:rPr lang="fi-FI" sz="1600" dirty="0" err="1" smtClean="0">
-                <a:solidFill>
-                  <a:schemeClr val="tx2"/>
-                </a:solidFill>
-              </a:rPr>
-              <a:t>Local</a:t>
-            </a:r>
-            <a:r>
-              <a:rPr lang="fi-FI" sz="1600" dirty="0" smtClean="0">
-                <a:solidFill>
-                  <a:schemeClr val="tx2"/>
-                </a:solidFill>
-              </a:rPr>
-              <a:t> </a:t>
-            </a:r>
-            <a:r>
-              <a:rPr lang="fi-FI" sz="1600" dirty="0" err="1" smtClean="0">
-                <a:solidFill>
-                  <a:schemeClr val="tx2"/>
-                </a:solidFill>
-              </a:rPr>
-              <a:t>storage</a:t>
-            </a:r>
-            <a:r>
-              <a:rPr lang="fi-FI" sz="1600" dirty="0" smtClean="0">
-                <a:solidFill>
-                  <a:schemeClr val="tx2"/>
-                </a:solidFill>
-              </a:rPr>
-              <a:t>. </a:t>
-            </a:r>
-            <a:r>
-              <a:rPr lang="fi-FI" sz="1600" dirty="0" err="1" smtClean="0">
-                <a:solidFill>
-                  <a:schemeClr val="tx2"/>
-                </a:solidFill>
-              </a:rPr>
-              <a:t>Debugger</a:t>
-            </a:r>
-            <a:r>
-              <a:rPr lang="fi-FI" sz="1600" dirty="0" smtClean="0">
-                <a:solidFill>
-                  <a:schemeClr val="tx2"/>
-                </a:solidFill>
-              </a:rPr>
-              <a:t>.</a:t>
-            </a:r>
-            <a:endParaRPr lang="fi-FI" sz="1600" dirty="0" smtClean="0">
-              <a:solidFill>
-                <a:schemeClr val="tx2"/>
-              </a:solidFill>
-            </a:endParaRPr>
-          </a:p>
-          <a:p>
-            <a:pPr marL="285750" indent="-285750">
-              <a:buFont typeface="Arial" panose="020B0604020202020204" pitchFamily="34" charset="0"/>
-              <a:buChar char="•"/>
-            </a:pPr>
-            <a:r>
-              <a:rPr lang="fi-FI" sz="1600" dirty="0" smtClean="0">
-                <a:solidFill>
-                  <a:schemeClr val="tx2"/>
-                </a:solidFill>
-              </a:rPr>
-              <a:t>Can </a:t>
-            </a:r>
-            <a:r>
-              <a:rPr lang="fi-FI" sz="1600" dirty="0" err="1" smtClean="0">
-                <a:solidFill>
-                  <a:schemeClr val="tx2"/>
-                </a:solidFill>
-              </a:rPr>
-              <a:t>fetch</a:t>
-            </a:r>
-            <a:r>
-              <a:rPr lang="fi-FI" sz="1600" dirty="0" smtClean="0">
-                <a:solidFill>
-                  <a:schemeClr val="tx2"/>
-                </a:solidFill>
-              </a:rPr>
-              <a:t> </a:t>
-            </a:r>
-            <a:r>
-              <a:rPr lang="fi-FI" sz="1600" dirty="0" err="1" smtClean="0">
-                <a:solidFill>
-                  <a:schemeClr val="tx2"/>
-                </a:solidFill>
-              </a:rPr>
-              <a:t>content</a:t>
-            </a:r>
-            <a:r>
-              <a:rPr lang="fi-FI" sz="1600" dirty="0" smtClean="0">
-                <a:solidFill>
-                  <a:schemeClr val="tx2"/>
-                </a:solidFill>
-              </a:rPr>
-              <a:t> </a:t>
-            </a:r>
-            <a:r>
-              <a:rPr lang="fi-FI" sz="1600" dirty="0" err="1" smtClean="0">
-                <a:solidFill>
-                  <a:schemeClr val="tx2"/>
-                </a:solidFill>
-              </a:rPr>
-              <a:t>from</a:t>
-            </a:r>
-            <a:r>
-              <a:rPr lang="fi-FI" sz="1600" dirty="0" smtClean="0">
-                <a:solidFill>
-                  <a:schemeClr val="tx2"/>
-                </a:solidFill>
-              </a:rPr>
-              <a:t> </a:t>
-            </a:r>
-            <a:r>
-              <a:rPr lang="fi-FI" sz="1600" dirty="0" err="1" smtClean="0">
-                <a:solidFill>
-                  <a:schemeClr val="tx2"/>
-                </a:solidFill>
-              </a:rPr>
-              <a:t>many</a:t>
-            </a:r>
-            <a:r>
-              <a:rPr lang="fi-FI" sz="1600" dirty="0" smtClean="0">
-                <a:solidFill>
-                  <a:schemeClr val="tx2"/>
-                </a:solidFill>
-              </a:rPr>
-              <a:t> </a:t>
-            </a:r>
-            <a:r>
-              <a:rPr lang="fi-FI" sz="1600" dirty="0" err="1" smtClean="0">
-                <a:solidFill>
-                  <a:schemeClr val="tx2"/>
-                </a:solidFill>
-              </a:rPr>
-              <a:t>servers</a:t>
-            </a:r>
-            <a:endParaRPr lang="fi-FI" sz="1600" dirty="0" smtClean="0">
-              <a:solidFill>
-                <a:schemeClr val="tx2"/>
-              </a:solidFill>
-            </a:endParaRPr>
-          </a:p>
-          <a:p>
-            <a:pPr marL="285750" indent="-285750">
-              <a:buFont typeface="Arial" panose="020B0604020202020204" pitchFamily="34" charset="0"/>
-              <a:buChar char="•"/>
-            </a:pPr>
-            <a:r>
-              <a:rPr lang="fi-FI" sz="1600" dirty="0" err="1" smtClean="0">
-                <a:solidFill>
-                  <a:schemeClr val="tx2"/>
-                </a:solidFill>
-              </a:rPr>
-              <a:t>Maintains</a:t>
-            </a:r>
-            <a:r>
-              <a:rPr lang="fi-FI" sz="1600" dirty="0" smtClean="0">
-                <a:solidFill>
-                  <a:schemeClr val="tx2"/>
-                </a:solidFill>
-              </a:rPr>
-              <a:t> </a:t>
-            </a:r>
-            <a:r>
-              <a:rPr lang="fi-FI" sz="1600" dirty="0" err="1" smtClean="0">
-                <a:solidFill>
-                  <a:schemeClr val="tx2"/>
-                </a:solidFill>
-              </a:rPr>
-              <a:t>hidden</a:t>
-            </a:r>
-            <a:r>
-              <a:rPr lang="fi-FI" sz="1600" dirty="0" smtClean="0">
-                <a:solidFill>
-                  <a:schemeClr val="tx2"/>
-                </a:solidFill>
-              </a:rPr>
-              <a:t> info </a:t>
-            </a:r>
-            <a:r>
-              <a:rPr lang="fi-FI" sz="1600" dirty="0" err="1" smtClean="0">
-                <a:solidFill>
-                  <a:schemeClr val="tx2"/>
-                </a:solidFill>
-              </a:rPr>
-              <a:t>sent</a:t>
-            </a:r>
-            <a:r>
-              <a:rPr lang="fi-FI" sz="1600" dirty="0" smtClean="0">
-                <a:solidFill>
-                  <a:schemeClr val="tx2"/>
-                </a:solidFill>
-              </a:rPr>
-              <a:t> and </a:t>
-            </a:r>
-            <a:r>
-              <a:rPr lang="fi-FI" sz="1600" dirty="0" err="1" smtClean="0">
-                <a:solidFill>
-                  <a:schemeClr val="tx2"/>
-                </a:solidFill>
-              </a:rPr>
-              <a:t>later</a:t>
-            </a:r>
-            <a:r>
-              <a:rPr lang="fi-FI" sz="1600" dirty="0" smtClean="0">
-                <a:solidFill>
-                  <a:schemeClr val="tx2"/>
-                </a:solidFill>
-              </a:rPr>
-              <a:t> </a:t>
-            </a:r>
-            <a:r>
-              <a:rPr lang="fi-FI" sz="1600" dirty="0" err="1" smtClean="0">
-                <a:solidFill>
-                  <a:schemeClr val="tx2"/>
-                </a:solidFill>
-              </a:rPr>
-              <a:t>again</a:t>
-            </a:r>
-            <a:r>
-              <a:rPr lang="fi-FI" sz="1600" dirty="0" smtClean="0">
-                <a:solidFill>
-                  <a:schemeClr val="tx2"/>
-                </a:solidFill>
-              </a:rPr>
-              <a:t> </a:t>
-            </a:r>
-            <a:r>
-              <a:rPr lang="fi-FI" sz="1600" dirty="0" err="1" smtClean="0">
-                <a:solidFill>
-                  <a:schemeClr val="tx2"/>
-                </a:solidFill>
-              </a:rPr>
-              <a:t>accessed</a:t>
-            </a:r>
-            <a:r>
-              <a:rPr lang="fi-FI" sz="1600" dirty="0" smtClean="0">
-                <a:solidFill>
-                  <a:schemeClr val="tx2"/>
-                </a:solidFill>
-              </a:rPr>
-              <a:t> </a:t>
-            </a:r>
-            <a:r>
-              <a:rPr lang="fi-FI" sz="1600" dirty="0" err="1" smtClean="0">
-                <a:solidFill>
-                  <a:schemeClr val="tx2"/>
-                </a:solidFill>
-              </a:rPr>
-              <a:t>by</a:t>
-            </a:r>
-            <a:r>
-              <a:rPr lang="fi-FI" sz="1600" dirty="0" smtClean="0">
-                <a:solidFill>
-                  <a:schemeClr val="tx2"/>
-                </a:solidFill>
-              </a:rPr>
-              <a:t> </a:t>
-            </a:r>
-            <a:r>
-              <a:rPr lang="fi-FI" sz="1600" dirty="0" err="1" smtClean="0">
-                <a:solidFill>
-                  <a:schemeClr val="tx2"/>
-                </a:solidFill>
-              </a:rPr>
-              <a:t>the</a:t>
-            </a:r>
-            <a:r>
-              <a:rPr lang="fi-FI" sz="1600" dirty="0" smtClean="0">
-                <a:solidFill>
-                  <a:schemeClr val="tx2"/>
-                </a:solidFill>
-              </a:rPr>
-              <a:t> </a:t>
-            </a:r>
-            <a:r>
-              <a:rPr lang="fi-FI" sz="1600" dirty="0" err="1" smtClean="0">
-                <a:solidFill>
-                  <a:schemeClr val="tx2"/>
-                </a:solidFill>
-              </a:rPr>
-              <a:t>server</a:t>
-            </a:r>
-            <a:r>
-              <a:rPr lang="fi-FI" sz="1600" dirty="0" smtClean="0">
-                <a:solidFill>
-                  <a:schemeClr val="tx2"/>
-                </a:solidFill>
-              </a:rPr>
-              <a:t>, </a:t>
-            </a:r>
-            <a:r>
-              <a:rPr lang="fi-FI" sz="1600" dirty="0" err="1" smtClean="0">
-                <a:solidFill>
-                  <a:schemeClr val="tx2"/>
-                </a:solidFill>
-              </a:rPr>
-              <a:t>usually</a:t>
-            </a:r>
-            <a:r>
-              <a:rPr lang="fi-FI" sz="1600" dirty="0" smtClean="0">
-                <a:solidFill>
-                  <a:schemeClr val="tx2"/>
-                </a:solidFill>
-              </a:rPr>
-              <a:t> </a:t>
-            </a:r>
-            <a:r>
-              <a:rPr lang="fi-FI" sz="1600" dirty="0" err="1" smtClean="0">
-                <a:solidFill>
-                  <a:schemeClr val="tx2"/>
-                </a:solidFill>
-              </a:rPr>
-              <a:t>encrypted</a:t>
-            </a:r>
-            <a:r>
-              <a:rPr lang="fi-FI" sz="1600" dirty="0" smtClean="0">
-                <a:solidFill>
-                  <a:schemeClr val="tx2"/>
-                </a:solidFill>
-              </a:rPr>
-              <a:t>, </a:t>
-            </a:r>
-            <a:r>
-              <a:rPr lang="fi-FI" sz="1600" dirty="0" smtClean="0">
-                <a:solidFill>
-                  <a:schemeClr val="tx2"/>
-                </a:solidFill>
-              </a:rPr>
-              <a:t>(</a:t>
-            </a:r>
-            <a:r>
-              <a:rPr lang="fi-FI" sz="1600" dirty="0" err="1" smtClean="0">
-                <a:solidFill>
-                  <a:schemeClr val="tx2"/>
-                </a:solidFill>
-              </a:rPr>
-              <a:t>like</a:t>
-            </a:r>
-            <a:r>
-              <a:rPr lang="fi-FI" sz="1600" dirty="0" smtClean="0">
-                <a:solidFill>
-                  <a:schemeClr val="tx2"/>
-                </a:solidFill>
-              </a:rPr>
-              <a:t> </a:t>
-            </a:r>
-            <a:r>
-              <a:rPr lang="fi-FI" sz="1600" dirty="0" err="1" smtClean="0">
-                <a:solidFill>
-                  <a:schemeClr val="tx2"/>
-                </a:solidFill>
-              </a:rPr>
-              <a:t>antiforgerytokens</a:t>
-            </a:r>
-            <a:r>
-              <a:rPr lang="fi-FI" sz="1600" dirty="0" smtClean="0">
-                <a:solidFill>
-                  <a:schemeClr val="tx2"/>
-                </a:solidFill>
-              </a:rPr>
-              <a:t>, </a:t>
-            </a:r>
-            <a:r>
-              <a:rPr lang="fi-FI" sz="1600" dirty="0" err="1" smtClean="0">
-                <a:solidFill>
-                  <a:schemeClr val="tx2"/>
-                </a:solidFill>
-              </a:rPr>
-              <a:t>auth_key</a:t>
-            </a:r>
-            <a:r>
-              <a:rPr lang="fi-FI" sz="1600" dirty="0" smtClean="0">
-                <a:solidFill>
-                  <a:schemeClr val="tx2"/>
-                </a:solidFill>
-              </a:rPr>
-              <a:t>, </a:t>
-            </a:r>
-            <a:r>
-              <a:rPr lang="fi-FI" sz="1600" dirty="0" err="1" smtClean="0">
-                <a:solidFill>
-                  <a:schemeClr val="tx2"/>
-                </a:solidFill>
-              </a:rPr>
-              <a:t>api_key</a:t>
-            </a:r>
-            <a:r>
-              <a:rPr lang="fi-FI" sz="1600" dirty="0" smtClean="0">
-                <a:solidFill>
-                  <a:schemeClr val="tx2"/>
-                </a:solidFill>
-              </a:rPr>
-              <a:t>) </a:t>
-            </a:r>
-            <a:r>
-              <a:rPr lang="fi-FI" sz="1600" dirty="0" smtClean="0">
-                <a:solidFill>
-                  <a:schemeClr val="tx2"/>
-                </a:solidFill>
-              </a:rPr>
-              <a:t>and </a:t>
-            </a:r>
-            <a:r>
-              <a:rPr lang="fi-FI" sz="1600" dirty="0" err="1" smtClean="0">
-                <a:solidFill>
-                  <a:schemeClr val="tx2"/>
-                </a:solidFill>
-              </a:rPr>
-              <a:t>so</a:t>
-            </a:r>
-            <a:r>
-              <a:rPr lang="fi-FI" sz="1600" dirty="0" smtClean="0">
-                <a:solidFill>
-                  <a:schemeClr val="tx2"/>
-                </a:solidFill>
-              </a:rPr>
-              <a:t> on.</a:t>
-            </a:r>
-          </a:p>
-          <a:p>
-            <a:pPr marL="285750" indent="-285750">
-              <a:buFont typeface="Arial" panose="020B0604020202020204" pitchFamily="34" charset="0"/>
-              <a:buChar char="•"/>
-            </a:pPr>
-            <a:r>
-              <a:rPr lang="fi-FI" sz="1600" dirty="0" err="1" smtClean="0">
-                <a:solidFill>
-                  <a:schemeClr val="tx2"/>
-                </a:solidFill>
-              </a:rPr>
-              <a:t>Support</a:t>
-            </a:r>
-            <a:r>
-              <a:rPr lang="fi-FI" sz="1600" dirty="0" smtClean="0">
-                <a:solidFill>
-                  <a:schemeClr val="tx2"/>
-                </a:solidFill>
-              </a:rPr>
-              <a:t> for </a:t>
-            </a:r>
-            <a:r>
-              <a:rPr lang="fi-FI" sz="1600" dirty="0" err="1" smtClean="0">
-                <a:solidFill>
-                  <a:schemeClr val="tx2"/>
-                </a:solidFill>
-              </a:rPr>
-              <a:t>the</a:t>
-            </a:r>
-            <a:r>
-              <a:rPr lang="fi-FI" sz="1600" dirty="0" smtClean="0">
-                <a:solidFill>
-                  <a:schemeClr val="tx2"/>
-                </a:solidFill>
-              </a:rPr>
-              <a:t> </a:t>
-            </a:r>
-            <a:r>
-              <a:rPr lang="fi-FI" sz="1600" dirty="0" err="1" smtClean="0">
-                <a:solidFill>
-                  <a:schemeClr val="tx2"/>
-                </a:solidFill>
-              </a:rPr>
-              <a:t>carrier</a:t>
-            </a:r>
-            <a:r>
-              <a:rPr lang="fi-FI" sz="1600" dirty="0" smtClean="0">
-                <a:solidFill>
-                  <a:schemeClr val="tx2"/>
-                </a:solidFill>
-              </a:rPr>
-              <a:t> </a:t>
-            </a:r>
-            <a:r>
-              <a:rPr lang="fi-FI" sz="1600" dirty="0" err="1" smtClean="0">
-                <a:solidFill>
-                  <a:schemeClr val="tx2"/>
-                </a:solidFill>
-              </a:rPr>
-              <a:t>security</a:t>
-            </a:r>
-            <a:r>
-              <a:rPr lang="fi-FI" sz="1600" dirty="0" smtClean="0">
-                <a:solidFill>
-                  <a:schemeClr val="tx2"/>
-                </a:solidFill>
-              </a:rPr>
-              <a:t> (</a:t>
-            </a:r>
-            <a:r>
-              <a:rPr lang="fi-FI" sz="1600" dirty="0" err="1" smtClean="0">
-                <a:solidFill>
-                  <a:schemeClr val="tx2"/>
-                </a:solidFill>
-              </a:rPr>
-              <a:t>client</a:t>
-            </a:r>
-            <a:r>
-              <a:rPr lang="fi-FI" sz="1600" dirty="0" smtClean="0">
-                <a:solidFill>
-                  <a:schemeClr val="tx2"/>
-                </a:solidFill>
-              </a:rPr>
-              <a:t>-side)</a:t>
-            </a:r>
-            <a:endParaRPr lang="fi-FI" sz="1600" dirty="0" smtClean="0">
-              <a:solidFill>
-                <a:schemeClr val="tx2"/>
-              </a:solidFill>
-            </a:endParaRPr>
-          </a:p>
-          <a:p>
-            <a:endParaRPr lang="en-US" sz="1600" dirty="0" smtClean="0">
-              <a:solidFill>
-                <a:schemeClr val="tx2"/>
-              </a:solidFill>
-            </a:endParaRPr>
-          </a:p>
-          <a:p>
-            <a:endParaRPr lang="en-US" sz="1600" dirty="0" smtClean="0">
+            <a:endParaRPr lang="en-US" sz="1600" dirty="0">
               <a:solidFill>
                 <a:schemeClr val="tx2"/>
               </a:solidFill>
@@ -4750,7 +4521,7 @@
           <a:lstStyle/>
           <a:p>
             <a:r>
-              <a:rPr lang="en-US" b="1" dirty="0" smtClean="0">
+              <a:rPr lang="en-US" b="1" dirty="0">
                 <a:solidFill>
                   <a:schemeClr val="tx2"/>
                 </a:solidFill>
@@ -4758,7 +4529,7 @@
               <a:t>Internet, TCP/IP, </a:t>
             </a:r>
             <a:r>
-              <a:rPr lang="en-US" b="1" dirty="0" err="1" smtClean="0">
+              <a:rPr lang="en-US" b="1" dirty="0" err="1">
                 <a:solidFill>
                   <a:schemeClr val="tx2"/>
                 </a:solidFill>
@@ -4766,7 +4537,7 @@
               <a:t>HttpRequest</a:t>
             </a:r>
             <a:r>
-              <a:rPr lang="en-US" b="1" dirty="0" smtClean="0">
+              <a:rPr lang="en-US" b="1" dirty="0">
                 <a:solidFill>
                   <a:schemeClr val="tx2"/>
                 </a:solidFill>
@@ -4774,7 +4545,7 @@
               <a:t>, </a:t>
             </a:r>
             <a:r>
-              <a:rPr lang="en-US" b="1" dirty="0" err="1" smtClean="0">
+              <a:rPr lang="en-US" b="1" dirty="0" err="1">
                 <a:solidFill>
                   <a:schemeClr val="tx2"/>
                 </a:solidFill>
@@ -4782,7 +4553,7 @@
               <a:t>HttpResponse</a:t>
             </a:r>
             <a:r>
-              <a:rPr lang="en-US" b="1" dirty="0" smtClean="0">
+              <a:rPr lang="en-US" b="1" dirty="0">
                 <a:solidFill>
                   <a:schemeClr val="tx2"/>
                 </a:solidFill>
@@ -4790,13 +4561,13 @@
               <a:t>, Https, SSL, …</a:t>
             </a:r>
             <a:br>
-              <a:rPr lang="en-US" b="1" dirty="0" smtClean="0">
+              <a:rPr lang="en-US" b="1" dirty="0">
                 <a:solidFill>
                   <a:schemeClr val="tx2"/>
                 </a:solidFill>
               </a:rPr>
             </a:br>
-            <a:endParaRPr lang="en-US" b="1" dirty="0" smtClean="0">
+            <a:endParaRPr lang="en-US" b="1" dirty="0">
               <a:solidFill>
                 <a:schemeClr val="tx2"/>
               </a:solidFill>
@@ -4808,7 +4579,7 @@
               <a:buChar char="•"/>
             </a:pPr>
             <a:r>
-              <a:rPr lang="en-US" sz="1600" dirty="0" smtClean="0">
+              <a:rPr lang="en-US" sz="1600" dirty="0">
                 <a:solidFill>
                   <a:schemeClr val="tx2"/>
                 </a:solidFill>
@@ -4822,58 +4593,13 @@
               <a:buChar char="•"/>
             </a:pPr>
             <a:r>
-              <a:rPr lang="en-US" sz="1600" dirty="0" smtClean="0">
-                <a:solidFill>
-                  <a:schemeClr val="tx2"/>
-                </a:solidFill>
-              </a:rPr>
-              <a:t>Security: We know </a:t>
-            </a:r>
-            <a:r>
-              <a:rPr lang="en-US" sz="1600" dirty="0" smtClean="0">
-                <a:solidFill>
-                  <a:schemeClr val="tx2"/>
-                </a:solidFill>
-              </a:rPr>
-              <a:t>that the </a:t>
-            </a:r>
-            <a:r>
-              <a:rPr lang="en-US" sz="1600" dirty="0" smtClean="0">
-                <a:solidFill>
-                  <a:schemeClr val="tx2"/>
-                </a:solidFill>
-              </a:rPr>
-              <a:t>ends are </a:t>
-            </a:r>
-            <a:r>
-              <a:rPr lang="en-US" sz="1600" dirty="0" smtClean="0">
-                <a:solidFill>
-                  <a:schemeClr val="tx2"/>
-                </a:solidFill>
-              </a:rPr>
-              <a:t>who </a:t>
-            </a:r>
-            <a:r>
-              <a:rPr lang="en-US" sz="1600" dirty="0" smtClean="0">
-                <a:solidFill>
-                  <a:schemeClr val="tx2"/>
-                </a:solidFill>
-              </a:rPr>
-              <a:t>they </a:t>
-            </a:r>
-            <a:r>
-              <a:rPr lang="en-US" sz="1600" dirty="0" smtClean="0">
-                <a:solidFill>
-                  <a:schemeClr val="tx2"/>
-                </a:solidFill>
-              </a:rPr>
-              <a:t>say they are</a:t>
-            </a:r>
-            <a:endParaRPr lang="en-US" sz="1600" dirty="0" smtClean="0">
-              <a:solidFill>
-                <a:schemeClr val="tx2"/>
-              </a:solidFill>
-            </a:endParaRPr>
+              <a:rPr lang="en-US" sz="1600" dirty="0">
+                <a:solidFill>
+                  <a:schemeClr val="tx2"/>
+                </a:solidFill>
+              </a:rPr>
+              <a:t>Security: We know that the ends are who they say they are</a:t>
+            </a:r>
           </a:p>
           <a:p>
             <a:pPr marL="285750" indent="-285750">
@@ -4881,7 +4607,7 @@
               <a:buChar char="•"/>
             </a:pPr>
             <a:r>
-              <a:rPr lang="en-US" sz="1600" dirty="0" smtClean="0">
+              <a:rPr lang="en-US" sz="1600" dirty="0">
                 <a:solidFill>
                   <a:schemeClr val="tx2"/>
                 </a:solidFill>
@@ -4895,20 +4621,12 @@
               <a:buChar char="•"/>
             </a:pPr>
             <a:r>
-              <a:rPr lang="en-US" sz="1600" dirty="0" smtClean="0">
-                <a:solidFill>
-                  <a:schemeClr val="tx2"/>
-                </a:solidFill>
-              </a:rPr>
-              <a:t>Reliability, package </a:t>
-            </a:r>
-            <a:r>
-              <a:rPr lang="en-US" sz="1600" dirty="0" smtClean="0">
-                <a:solidFill>
-                  <a:schemeClr val="tx2"/>
-                </a:solidFill>
-              </a:rPr>
-              <a:t>handling</a:t>
+              <a:rPr lang="en-US" sz="1600" dirty="0">
+                <a:solidFill>
+                  <a:schemeClr val="tx2"/>
+                </a:solidFill>
+              </a:rPr>
+              <a:t>Reliability, package handling</a:t>
             </a:r>
           </a:p>
           <a:p>
@@ -4917,18 +4635,13 @@
               <a:buChar char="•"/>
             </a:pPr>
             <a:r>
-              <a:rPr lang="en-US" sz="1600" dirty="0" smtClean="0">
+              <a:rPr lang="en-US" sz="1600" dirty="0">
                 <a:solidFill>
                   <a:schemeClr val="tx2"/>
                 </a:solidFill>
               </a:rPr>
               <a:t>Cache proxies</a:t>
             </a:r>
-            <a:endParaRPr lang="en-US" sz="1600" dirty="0" smtClean="0">
-              <a:solidFill>
-                <a:schemeClr val="tx2"/>
-              </a:solidFill>
-            </a:endParaRPr>
           </a:p>
         </p:txBody>
       </p:sp>
@@ -4969,7 +4682,7 @@
           <a:lstStyle/>
           <a:p>
             <a:r>
-              <a:rPr lang="en-US" b="1" dirty="0" smtClean="0">
+              <a:rPr lang="en-US" b="1" dirty="0">
                 <a:solidFill>
                   <a:schemeClr val="tx2"/>
                 </a:solidFill>
@@ -4977,13 +4690,13 @@
               <a:t>Server = Web server, Application container, Database server</a:t>
             </a:r>
             <a:br>
-              <a:rPr lang="en-US" b="1" dirty="0" smtClean="0">
+              <a:rPr lang="en-US" b="1" dirty="0">
                 <a:solidFill>
                   <a:schemeClr val="tx2"/>
                 </a:solidFill>
               </a:rPr>
             </a:br>
-            <a:endParaRPr lang="en-US" b="1" dirty="0" smtClean="0">
+            <a:endParaRPr lang="en-US" b="1" dirty="0">
               <a:solidFill>
                 <a:schemeClr val="tx2"/>
               </a:solidFill>
@@ -4995,7 +4708,7 @@
               <a:buChar char="•"/>
             </a:pPr>
             <a:r>
-              <a:rPr lang="en-US" sz="1600" dirty="0" smtClean="0">
+              <a:rPr lang="en-US" sz="1600" dirty="0">
                 <a:solidFill>
                   <a:schemeClr val="tx2"/>
                 </a:solidFill>
@@ -5009,7 +4722,7 @@
               <a:buChar char="•"/>
             </a:pPr>
             <a:r>
-              <a:rPr lang="en-US" sz="1600" dirty="0" smtClean="0">
+              <a:rPr lang="en-US" sz="1600" dirty="0">
                 <a:solidFill>
                   <a:schemeClr val="tx2"/>
                 </a:solidFill>
@@ -5023,7 +4736,7 @@
               <a:buChar char="•"/>
             </a:pPr>
             <a:r>
-              <a:rPr lang="en-US" sz="1600" dirty="0" smtClean="0">
+              <a:rPr lang="en-US" sz="1600" dirty="0">
                 <a:solidFill>
                   <a:schemeClr val="tx2"/>
                 </a:solidFill>
@@ -5037,7 +4750,7 @@
               <a:buChar char="•"/>
             </a:pPr>
             <a:r>
-              <a:rPr lang="en-US" sz="1600" dirty="0" smtClean="0">
+              <a:rPr lang="en-US" sz="1600" dirty="0">
                 <a:solidFill>
                   <a:schemeClr val="tx2"/>
                 </a:solidFill>
@@ -5051,7 +4764,7 @@
               <a:buChar char="•"/>
             </a:pPr>
             <a:r>
-              <a:rPr lang="fi-FI" sz="1600" dirty="0" err="1" smtClean="0">
+              <a:rPr lang="fi-FI" sz="1600" dirty="0" err="1">
                 <a:solidFill>
                   <a:schemeClr val="tx2"/>
                 </a:solidFill>
@@ -5059,7 +4772,7 @@
               <a:t>Runs</a:t>
             </a:r>
             <a:r>
-              <a:rPr lang="fi-FI" sz="1600" dirty="0" smtClean="0">
+              <a:rPr lang="fi-FI" sz="1600" dirty="0">
                 <a:solidFill>
                   <a:schemeClr val="tx2"/>
                 </a:solidFill>
@@ -5067,7 +4780,7 @@
               <a:t> </a:t>
             </a:r>
             <a:r>
-              <a:rPr lang="fi-FI" sz="1600" dirty="0" err="1" smtClean="0">
+              <a:rPr lang="fi-FI" sz="1600" dirty="0" err="1">
                 <a:solidFill>
                   <a:schemeClr val="tx2"/>
                 </a:solidFill>
@@ -5075,7 +4788,7 @@
               <a:t>code</a:t>
             </a:r>
             <a:r>
-              <a:rPr lang="fi-FI" sz="1600" dirty="0" smtClean="0">
+              <a:rPr lang="fi-FI" sz="1600" dirty="0">
                 <a:solidFill>
                   <a:schemeClr val="tx2"/>
                 </a:solidFill>
@@ -5083,7 +4796,7 @@
               <a:t>, </a:t>
             </a:r>
             <a:r>
-              <a:rPr lang="fi-FI" sz="1600" dirty="0" err="1" smtClean="0">
+              <a:rPr lang="fi-FI" sz="1600" dirty="0" err="1">
                 <a:solidFill>
                   <a:schemeClr val="tx2"/>
                 </a:solidFill>
@@ -5091,7 +4804,7 @@
               <a:t>maintains</a:t>
             </a:r>
             <a:r>
-              <a:rPr lang="fi-FI" sz="1600" dirty="0" smtClean="0">
+              <a:rPr lang="fi-FI" sz="1600" dirty="0">
                 <a:solidFill>
                   <a:schemeClr val="tx2"/>
                 </a:solidFill>
@@ -5099,7 +4812,7 @@
               <a:t> </a:t>
             </a:r>
             <a:r>
-              <a:rPr lang="fi-FI" sz="1600" dirty="0" err="1" smtClean="0">
+              <a:rPr lang="fi-FI" sz="1600" dirty="0" err="1">
                 <a:solidFill>
                   <a:schemeClr val="tx2"/>
                 </a:solidFill>
@@ -5107,7 +4820,7 @@
               <a:t>object</a:t>
             </a:r>
             <a:r>
-              <a:rPr lang="fi-FI" sz="1600" dirty="0" smtClean="0">
+              <a:rPr lang="fi-FI" sz="1600" dirty="0">
                 <a:solidFill>
                   <a:schemeClr val="tx2"/>
                 </a:solidFill>
@@ -5115,157 +4828,12 @@
               <a:t> </a:t>
             </a:r>
             <a:r>
-              <a:rPr lang="fi-FI" sz="1600" dirty="0" err="1" smtClean="0">
+              <a:rPr lang="fi-FI" sz="1600" dirty="0" err="1">
                 <a:solidFill>
                   <a:schemeClr val="tx2"/>
                 </a:solidFill>
               </a:rPr>
               <a:t>structures</a:t>
-            </a:r>
-            <a:endParaRPr lang="fi-FI" sz="1600" dirty="0" smtClean="0">
-              <a:solidFill>
-                <a:schemeClr val="tx2"/>
-              </a:solidFill>
-            </a:endParaRPr>
-          </a:p>
-          <a:p>
-            <a:pPr marL="285750" indent="-285750">
-              <a:buFont typeface="Arial" panose="020B0604020202020204" pitchFamily="34" charset="0"/>
-              <a:buChar char="•"/>
-            </a:pPr>
-            <a:r>
-              <a:rPr lang="fi-FI" sz="1600" dirty="0" err="1" smtClean="0">
-                <a:solidFill>
-                  <a:schemeClr val="tx2"/>
-                </a:solidFill>
-              </a:rPr>
-              <a:t>Interprets</a:t>
-            </a:r>
-            <a:r>
-              <a:rPr lang="fi-FI" sz="1600" dirty="0" smtClean="0">
-                <a:solidFill>
-                  <a:schemeClr val="tx2"/>
-                </a:solidFill>
-              </a:rPr>
-              <a:t> </a:t>
-            </a:r>
-            <a:r>
-              <a:rPr lang="fi-FI" sz="1600" dirty="0" smtClean="0">
-                <a:solidFill>
-                  <a:schemeClr val="tx2"/>
-                </a:solidFill>
-              </a:rPr>
-              <a:t>and </a:t>
-            </a:r>
-            <a:r>
-              <a:rPr lang="fi-FI" sz="1600" dirty="0" err="1" smtClean="0">
-                <a:solidFill>
-                  <a:schemeClr val="tx2"/>
-                </a:solidFill>
-              </a:rPr>
-              <a:t>parses</a:t>
-            </a:r>
-            <a:r>
-              <a:rPr lang="fi-FI" sz="1600" dirty="0" smtClean="0">
-                <a:solidFill>
-                  <a:schemeClr val="tx2"/>
-                </a:solidFill>
-              </a:rPr>
-              <a:t> </a:t>
-            </a:r>
-            <a:r>
-              <a:rPr lang="fi-FI" sz="1600" dirty="0" err="1" smtClean="0">
-                <a:solidFill>
-                  <a:schemeClr val="tx2"/>
-                </a:solidFill>
-              </a:rPr>
-              <a:t>requests</a:t>
-            </a:r>
-            <a:r>
-              <a:rPr lang="fi-FI" sz="1600" dirty="0" smtClean="0">
-                <a:solidFill>
-                  <a:schemeClr val="tx2"/>
-                </a:solidFill>
-              </a:rPr>
-              <a:t> (</a:t>
-            </a:r>
-            <a:r>
-              <a:rPr lang="fi-FI" sz="1600" dirty="0" err="1" smtClean="0">
-                <a:solidFill>
-                  <a:schemeClr val="tx2"/>
-                </a:solidFill>
-              </a:rPr>
-              <a:t>incl</a:t>
-            </a:r>
-            <a:r>
-              <a:rPr lang="fi-FI" sz="1600" dirty="0" smtClean="0">
-                <a:solidFill>
-                  <a:schemeClr val="tx2"/>
-                </a:solidFill>
-              </a:rPr>
-              <a:t>. AJAX)</a:t>
-            </a:r>
-          </a:p>
-          <a:p>
-            <a:pPr marL="285750" indent="-285750">
-              <a:buFont typeface="Arial" panose="020B0604020202020204" pitchFamily="34" charset="0"/>
-              <a:buChar char="•"/>
-            </a:pPr>
-            <a:r>
-              <a:rPr lang="fi-FI" sz="1600" dirty="0" err="1" smtClean="0">
-                <a:solidFill>
-                  <a:schemeClr val="tx2"/>
-                </a:solidFill>
-              </a:rPr>
-              <a:t>Writes</a:t>
-            </a:r>
-            <a:r>
-              <a:rPr lang="fi-FI" sz="1600" dirty="0" smtClean="0">
-                <a:solidFill>
-                  <a:schemeClr val="tx2"/>
-                </a:solidFill>
-              </a:rPr>
-              <a:t> </a:t>
-            </a:r>
-            <a:r>
-              <a:rPr lang="fi-FI" sz="1600" dirty="0" err="1" smtClean="0">
-                <a:solidFill>
-                  <a:schemeClr val="tx2"/>
-                </a:solidFill>
-              </a:rPr>
-              <a:t>responses</a:t>
-            </a:r>
-            <a:r>
-              <a:rPr lang="fi-FI" sz="1600" dirty="0" smtClean="0">
-                <a:solidFill>
-                  <a:schemeClr val="tx2"/>
-                </a:solidFill>
-              </a:rPr>
-              <a:t> </a:t>
-            </a:r>
-            <a:r>
-              <a:rPr lang="fi-FI" sz="1600" dirty="0" err="1" smtClean="0">
-                <a:solidFill>
-                  <a:schemeClr val="tx2"/>
-                </a:solidFill>
-              </a:rPr>
-              <a:t>e.g</a:t>
-            </a:r>
-            <a:r>
-              <a:rPr lang="fi-FI" sz="1600" dirty="0" smtClean="0">
-                <a:solidFill>
-                  <a:schemeClr val="tx2"/>
-                </a:solidFill>
-              </a:rPr>
-              <a:t>. as </a:t>
-            </a:r>
-            <a:r>
-              <a:rPr lang="fi-FI" sz="1600" dirty="0" smtClean="0">
-                <a:solidFill>
-                  <a:schemeClr val="tx2"/>
-                </a:solidFill>
-              </a:rPr>
-              <a:t>HTML/JSON/XML</a:t>
             </a:r>
             <a:endParaRPr lang="fi-FI" sz="1600" dirty="0">
               <a:solidFill>
@@ -5279,42 +4847,69 @@
               <a:buChar char="•"/>
             </a:pPr>
             <a:r>
-              <a:rPr lang="fi-FI" sz="1600" dirty="0" err="1" smtClean="0">
-                <a:solidFill>
-                  <a:schemeClr val="tx2"/>
-                </a:solidFill>
-              </a:rPr>
-              <a:t>Validation</a:t>
-            </a:r>
-            <a:r>
-              <a:rPr lang="fi-FI" sz="1600" dirty="0" smtClean="0">
-                <a:solidFill>
-                  <a:schemeClr val="tx2"/>
-                </a:solidFill>
-              </a:rPr>
-              <a:t> of input (</a:t>
-            </a:r>
-            <a:r>
-              <a:rPr lang="fi-FI" sz="1600" dirty="0" err="1" smtClean="0">
-                <a:solidFill>
-                  <a:schemeClr val="tx2"/>
-                </a:solidFill>
-              </a:rPr>
-              <a:t>server</a:t>
-            </a:r>
-            <a:r>
-              <a:rPr lang="fi-FI" sz="1600" dirty="0" smtClean="0">
-                <a:solidFill>
-                  <a:schemeClr val="tx2"/>
-                </a:solidFill>
-              </a:rPr>
-              <a:t>-side)</a:t>
-            </a:r>
-            <a:endParaRPr lang="fi-FI" sz="1600" dirty="0" smtClean="0">
-              <a:solidFill>
-                <a:schemeClr val="tx2"/>
-              </a:solidFill>
-            </a:endParaRPr>
+              <a:rPr lang="fi-FI" sz="1600" dirty="0" err="1">
+                <a:solidFill>
+                  <a:schemeClr val="tx2"/>
+                </a:solidFill>
+              </a:rPr>
+              <a:t>Interprets</a:t>
+            </a:r>
+            <a:r>
+              <a:rPr lang="fi-FI" sz="1600" dirty="0">
+                <a:solidFill>
+                  <a:schemeClr val="tx2"/>
+                </a:solidFill>
+              </a:rPr>
+              <a:t> and </a:t>
+            </a:r>
+            <a:r>
+              <a:rPr lang="fi-FI" sz="1600" dirty="0" err="1">
+                <a:solidFill>
+                  <a:schemeClr val="tx2"/>
+                </a:solidFill>
+              </a:rPr>
+              <a:t>parses</a:t>
+            </a:r>
+            <a:r>
+              <a:rPr lang="fi-FI" sz="1600" dirty="0">
+                <a:solidFill>
+                  <a:schemeClr val="tx2"/>
+                </a:solidFill>
+              </a:rPr>
+              <a:t> </a:t>
+            </a:r>
+            <a:r>
+              <a:rPr lang="fi-FI" sz="1600" dirty="0" err="1">
+                <a:solidFill>
+                  <a:schemeClr val="tx2"/>
+                </a:solidFill>
+              </a:rPr>
+              <a:t>requests</a:t>
+            </a:r>
+            <a:r>
+              <a:rPr lang="fi-FI" sz="1600" dirty="0">
+                <a:solidFill>
+                  <a:schemeClr val="tx2"/>
+                </a:solidFill>
+              </a:rPr>
+              <a:t> (</a:t>
+            </a:r>
+            <a:r>
+              <a:rPr lang="fi-FI" sz="1600" dirty="0" err="1">
+                <a:solidFill>
+                  <a:schemeClr val="tx2"/>
+                </a:solidFill>
+              </a:rPr>
+              <a:t>incl</a:t>
+            </a:r>
+            <a:r>
+              <a:rPr lang="fi-FI" sz="1600" dirty="0">
+                <a:solidFill>
+                  <a:schemeClr val="tx2"/>
+                </a:solidFill>
+              </a:rPr>
+              <a:t>. AJAX)</a:t>
+            </a:r>
           </a:p>
           <a:p>
             <a:pPr marL="285750" indent="-285750">
@@ -5322,34 +4917,53 @@
               <a:buChar char="•"/>
             </a:pPr>
             <a:r>
-              <a:rPr lang="fi-FI" sz="1600" dirty="0" smtClean="0">
-                <a:solidFill>
-                  <a:schemeClr val="tx2"/>
-                </a:solidFill>
-              </a:rPr>
-              <a:t>Session management (</a:t>
-            </a:r>
-            <a:r>
-              <a:rPr lang="fi-FI" sz="1600" dirty="0" err="1" smtClean="0">
-                <a:solidFill>
-                  <a:schemeClr val="tx2"/>
-                </a:solidFill>
-              </a:rPr>
-              <a:t>server</a:t>
-            </a:r>
-            <a:r>
-              <a:rPr lang="fi-FI" sz="1600" dirty="0" smtClean="0">
-                <a:solidFill>
-                  <a:schemeClr val="tx2"/>
-                </a:solidFill>
-              </a:rPr>
-              <a:t>-side)</a:t>
-            </a:r>
-            <a:endParaRPr lang="fi-FI" sz="1600" dirty="0" smtClean="0">
-              <a:solidFill>
-                <a:schemeClr val="tx2"/>
-              </a:solidFill>
-            </a:endParaRPr>
+              <a:rPr lang="fi-FI" sz="1600" dirty="0" err="1">
+                <a:solidFill>
+                  <a:schemeClr val="tx2"/>
+                </a:solidFill>
+              </a:rPr>
+              <a:t>Writes</a:t>
+            </a:r>
+            <a:r>
+              <a:rPr lang="fi-FI" sz="1600" dirty="0">
+                <a:solidFill>
+                  <a:schemeClr val="tx2"/>
+                </a:solidFill>
+              </a:rPr>
+              <a:t> </a:t>
+            </a:r>
+            <a:r>
+              <a:rPr lang="fi-FI" sz="1600" dirty="0" err="1">
+                <a:solidFill>
+                  <a:schemeClr val="tx2"/>
+                </a:solidFill>
+              </a:rPr>
+              <a:t>responses</a:t>
+            </a:r>
+            <a:r>
+              <a:rPr lang="fi-FI" sz="1600" dirty="0">
+                <a:solidFill>
+                  <a:schemeClr val="tx2"/>
+                </a:solidFill>
+              </a:rPr>
+              <a:t> </a:t>
+            </a:r>
+            <a:r>
+              <a:rPr lang="fi-FI" sz="1600" dirty="0" err="1">
+                <a:solidFill>
+                  <a:schemeClr val="tx2"/>
+                </a:solidFill>
+              </a:rPr>
+              <a:t>e.g</a:t>
+            </a:r>
+            <a:r>
+              <a:rPr lang="fi-FI" sz="1600" dirty="0">
+                <a:solidFill>
+                  <a:schemeClr val="tx2"/>
+                </a:solidFill>
+              </a:rPr>
+              <a:t>. as HTML/JSON/XML</a:t>
+            </a:r>
           </a:p>
           <a:p>
             <a:pPr marL="285750" indent="-285750">
@@ -5357,7 +4971,75 @@
               <a:buChar char="•"/>
             </a:pPr>
             <a:r>
-              <a:rPr lang="fi-FI" sz="1600" dirty="0" err="1" smtClean="0">
+              <a:rPr lang="fi-FI" sz="1600" dirty="0" err="1">
+                <a:solidFill>
+                  <a:schemeClr val="tx2"/>
+                </a:solidFill>
+              </a:rPr>
+              <a:t>Validation</a:t>
+            </a:r>
+            <a:r>
+              <a:rPr lang="fi-FI" sz="1600" dirty="0">
+                <a:solidFill>
+                  <a:schemeClr val="tx2"/>
+                </a:solidFill>
+              </a:rPr>
+              <a:t> of input (</a:t>
+            </a:r>
+            <a:r>
+              <a:rPr lang="fi-FI" sz="1600" dirty="0" err="1">
+                <a:solidFill>
+                  <a:schemeClr val="tx2"/>
+                </a:solidFill>
+              </a:rPr>
+              <a:t>server</a:t>
+            </a:r>
+            <a:r>
+              <a:rPr lang="fi-FI" sz="1600" dirty="0">
+                <a:solidFill>
+                  <a:schemeClr val="tx2"/>
+                </a:solidFill>
+              </a:rPr>
+              <a:t>-side)</a:t>
+            </a:r>
+          </a:p>
+          <a:p>
+            <a:pPr marL="285750" indent="-285750">
+              <a:buFont typeface="Arial" panose="020B0604020202020204" pitchFamily="34" charset="0"/>
+              <a:buChar char="•"/>
+            </a:pPr>
+            <a:r>
+              <a:rPr lang="fi-FI" sz="1600" dirty="0">
+                <a:solidFill>
+                  <a:schemeClr val="tx2"/>
+                </a:solidFill>
+              </a:rPr>
+              <a:t>Session management (</a:t>
+            </a:r>
+            <a:r>
+              <a:rPr lang="fi-FI" sz="1600" dirty="0" err="1">
+                <a:solidFill>
+                  <a:schemeClr val="tx2"/>
+                </a:solidFill>
+              </a:rPr>
+              <a:t>server</a:t>
+            </a:r>
+            <a:r>
+              <a:rPr lang="fi-FI" sz="1600" dirty="0">
+                <a:solidFill>
+                  <a:schemeClr val="tx2"/>
+                </a:solidFill>
+              </a:rPr>
+              <a:t>-side)</a:t>
+            </a:r>
+          </a:p>
+          <a:p>
+            <a:pPr marL="285750" indent="-285750">
+              <a:buFont typeface="Arial" panose="020B0604020202020204" pitchFamily="34" charset="0"/>
+              <a:buChar char="•"/>
+            </a:pPr>
+            <a:r>
+              <a:rPr lang="fi-FI" sz="1600" dirty="0" err="1">
                 <a:solidFill>
                   <a:schemeClr val="tx2"/>
                 </a:solidFill>
@@ -5365,7 +5047,7 @@
               <a:t>Authentication</a:t>
             </a:r>
             <a:r>
-              <a:rPr lang="fi-FI" sz="1600" dirty="0" smtClean="0">
+              <a:rPr lang="fi-FI" sz="1600" dirty="0">
                 <a:solidFill>
                   <a:schemeClr val="tx2"/>
                 </a:solidFill>
@@ -5373,7 +5055,7 @@
               <a:t> of </a:t>
             </a:r>
             <a:r>
-              <a:rPr lang="fi-FI" sz="1600" dirty="0" err="1" smtClean="0">
+              <a:rPr lang="fi-FI" sz="1600" dirty="0" err="1">
                 <a:solidFill>
                   <a:schemeClr val="tx2"/>
                 </a:solidFill>
@@ -5381,7 +5063,7 @@
               <a:t>users</a:t>
             </a:r>
             <a:r>
-              <a:rPr lang="fi-FI" sz="1600" dirty="0" smtClean="0">
+              <a:rPr lang="fi-FI" sz="1600" dirty="0">
                 <a:solidFill>
                   <a:schemeClr val="tx2"/>
                 </a:solidFill>
@@ -5389,7 +5071,7 @@
               <a:t> </a:t>
             </a:r>
             <a:r>
-              <a:rPr lang="fi-FI" sz="1600" b="1" dirty="0" smtClean="0">
+              <a:rPr lang="fi-FI" sz="1600" b="1" dirty="0">
                 <a:solidFill>
                   <a:schemeClr val="tx2"/>
                 </a:solidFill>
@@ -5397,7 +5079,7 @@
               <a:t>and</a:t>
             </a:r>
             <a:r>
-              <a:rPr lang="fi-FI" sz="1600" dirty="0" smtClean="0">
+              <a:rPr lang="fi-FI" sz="1600" dirty="0">
                 <a:solidFill>
                   <a:schemeClr val="tx2"/>
                 </a:solidFill>
@@ -5405,7 +5087,7 @@
               <a:t> </a:t>
             </a:r>
             <a:r>
-              <a:rPr lang="fi-FI" sz="1600" dirty="0" err="1" smtClean="0">
+              <a:rPr lang="fi-FI" sz="1600" dirty="0" err="1">
                 <a:solidFill>
                   <a:schemeClr val="tx2"/>
                 </a:solidFill>
@@ -5413,7 +5095,7 @@
               <a:t>client</a:t>
             </a:r>
             <a:r>
-              <a:rPr lang="fi-FI" sz="1600" dirty="0" smtClean="0">
+              <a:rPr lang="fi-FI" sz="1600" dirty="0">
                 <a:solidFill>
                   <a:schemeClr val="tx2"/>
                 </a:solidFill>
@@ -5421,7 +5103,7 @@
               <a:t> </a:t>
             </a:r>
             <a:r>
-              <a:rPr lang="fi-FI" sz="1600" dirty="0" err="1" smtClean="0">
+              <a:rPr lang="fi-FI" sz="1600" dirty="0" err="1">
                 <a:solidFill>
                   <a:schemeClr val="tx2"/>
                 </a:solidFill>
@@ -5429,7 +5111,7 @@
               <a:t>apps</a:t>
             </a:r>
             <a:r>
-              <a:rPr lang="fi-FI" sz="1600" dirty="0" smtClean="0">
+              <a:rPr lang="fi-FI" sz="1600" dirty="0">
                 <a:solidFill>
                   <a:schemeClr val="tx2"/>
                 </a:solidFill>
@@ -5437,7 +5119,7 @@
               <a:t> </a:t>
             </a:r>
             <a:r>
-              <a:rPr lang="fi-FI" sz="1600" b="1" dirty="0" smtClean="0">
+              <a:rPr lang="fi-FI" sz="1600" b="1" dirty="0">
                 <a:solidFill>
                   <a:schemeClr val="tx2"/>
                 </a:solidFill>
@@ -5445,7 +5127,7 @@
               <a:t>and</a:t>
             </a:r>
             <a:r>
-              <a:rPr lang="fi-FI" sz="1600" dirty="0" smtClean="0">
+              <a:rPr lang="fi-FI" sz="1600" dirty="0">
                 <a:solidFill>
                   <a:schemeClr val="tx2"/>
                 </a:solidFill>
@@ -5453,7 +5135,7 @@
               <a:t> </a:t>
             </a:r>
             <a:r>
-              <a:rPr lang="fi-FI" sz="1600" dirty="0" err="1" smtClean="0">
+              <a:rPr lang="fi-FI" sz="1600" dirty="0" err="1">
                 <a:solidFill>
                   <a:schemeClr val="tx2"/>
                 </a:solidFill>
@@ -5472,7 +5154,7 @@
               <a:buChar char="•"/>
             </a:pPr>
             <a:r>
-              <a:rPr lang="fi-FI" sz="1600" dirty="0" err="1" smtClean="0">
+              <a:rPr lang="fi-FI" sz="1600" dirty="0" err="1">
                 <a:solidFill>
                   <a:schemeClr val="tx2"/>
                 </a:solidFill>
@@ -5480,7 +5162,7 @@
               <a:t>Authorization</a:t>
             </a:r>
             <a:r>
-              <a:rPr lang="fi-FI" sz="1600" dirty="0" smtClean="0">
+              <a:rPr lang="fi-FI" sz="1600" dirty="0">
                 <a:solidFill>
                   <a:schemeClr val="tx2"/>
                 </a:solidFill>
@@ -5488,7 +5170,7 @@
               <a:t> (</a:t>
             </a:r>
             <a:r>
-              <a:rPr lang="fi-FI" sz="1600" dirty="0" err="1" smtClean="0">
+              <a:rPr lang="fi-FI" sz="1600" dirty="0" err="1">
                 <a:solidFill>
                   <a:schemeClr val="tx2"/>
                 </a:solidFill>
@@ -5496,7 +5178,7 @@
               <a:t>user-</a:t>
             </a:r>
             <a:r>
-              <a:rPr lang="fi-FI" sz="1600" dirty="0" smtClean="0">
+              <a:rPr lang="fi-FI" sz="1600" dirty="0">
                 <a:solidFill>
                   <a:schemeClr val="tx2"/>
                 </a:solidFill>
@@ -5504,7 +5186,7 @@
               <a:t>&gt;</a:t>
             </a:r>
             <a:r>
-              <a:rPr lang="fi-FI" sz="1600" dirty="0" err="1" smtClean="0">
+              <a:rPr lang="fi-FI" sz="1600" dirty="0" err="1">
                 <a:solidFill>
                   <a:schemeClr val="tx2"/>
                 </a:solidFill>
@@ -5512,7 +5194,7 @@
               <a:t>items</a:t>
             </a:r>
             <a:r>
-              <a:rPr lang="fi-FI" sz="1600" dirty="0" smtClean="0">
+              <a:rPr lang="fi-FI" sz="1600" dirty="0">
                 <a:solidFill>
                   <a:schemeClr val="tx2"/>
                 </a:solidFill>
@@ -5520,7 +5202,7 @@
               <a:t>, </a:t>
             </a:r>
             <a:r>
-              <a:rPr lang="fi-FI" sz="1600" dirty="0" err="1" smtClean="0">
+              <a:rPr lang="fi-FI" sz="1600" dirty="0" err="1">
                 <a:solidFill>
                   <a:schemeClr val="tx2"/>
                 </a:solidFill>
@@ -5528,7 +5210,7 @@
               <a:t>role</a:t>
             </a:r>
             <a:r>
-              <a:rPr lang="fi-FI" sz="1600" dirty="0" smtClean="0">
+              <a:rPr lang="fi-FI" sz="1600" dirty="0">
                 <a:solidFill>
                   <a:schemeClr val="tx2"/>
                 </a:solidFill>
@@ -5536,7 +5218,7 @@
               <a:t>-&gt;</a:t>
             </a:r>
             <a:r>
-              <a:rPr lang="fi-FI" sz="1600" dirty="0" err="1" smtClean="0">
+              <a:rPr lang="fi-FI" sz="1600" dirty="0" err="1">
                 <a:solidFill>
                   <a:schemeClr val="tx2"/>
                 </a:solidFill>
@@ -5544,14 +5226,60 @@
               <a:t>actions</a:t>
             </a:r>
             <a:r>
-              <a:rPr lang="fi-FI" sz="1600" dirty="0" smtClean="0">
+              <a:rPr lang="fi-FI" sz="1600" dirty="0">
                 <a:solidFill>
                   <a:schemeClr val="tx2"/>
                 </a:solidFill>
               </a:rPr>
               <a:t>)</a:t>
             </a:r>
-            <a:endParaRPr lang="fi-FI" sz="1600" dirty="0" smtClean="0">
+          </a:p>
+          <a:p>
+            <a:pPr marL="285750" indent="-285750">
+              <a:buFont typeface="Arial" panose="020B0604020202020204" pitchFamily="34" charset="0"/>
+              <a:buChar char="•"/>
+            </a:pPr>
+            <a:r>
+              <a:rPr lang="fi-FI" sz="1600" dirty="0" err="1">
+                <a:solidFill>
+                  <a:schemeClr val="tx2"/>
+                </a:solidFill>
+              </a:rPr>
+              <a:t>Conventions</a:t>
+            </a:r>
+            <a:r>
+              <a:rPr lang="fi-FI" sz="1600" dirty="0">
+                <a:solidFill>
+                  <a:schemeClr val="tx2"/>
+                </a:solidFill>
+              </a:rPr>
+              <a:t>/</a:t>
+            </a:r>
+            <a:r>
+              <a:rPr lang="fi-FI" sz="1600" dirty="0" err="1">
+                <a:solidFill>
+                  <a:schemeClr val="tx2"/>
+                </a:solidFill>
+              </a:rPr>
+              <a:t>Annotations</a:t>
+            </a:r>
+            <a:r>
+              <a:rPr lang="fi-FI" sz="1600" dirty="0">
+                <a:solidFill>
+                  <a:schemeClr val="tx2"/>
+                </a:solidFill>
+              </a:rPr>
+              <a:t>/</a:t>
+            </a:r>
+            <a:r>
+              <a:rPr lang="fi-FI" sz="1600" dirty="0" err="1">
+                <a:solidFill>
+                  <a:schemeClr val="tx2"/>
+                </a:solidFill>
+              </a:rPr>
+              <a:t>Configurations</a:t>
+            </a:r>
+            <a:endParaRPr lang="fi-FI" sz="1600" dirty="0">
               <a:solidFill>
                 <a:schemeClr val="tx2"/>
               </a:solidFill>
@@ -5568,41 +5296,65 @@
                   <a:schemeClr val="tx2"/>
                 </a:solidFill>
               </a:rPr>
-              <a:t>Conventions</a:t>
-            </a:r>
-            <a:r>
-              <a:rPr lang="fi-FI" sz="1600" dirty="0">
-                <a:solidFill>
-                  <a:schemeClr val="tx2"/>
-                </a:solidFill>
-              </a:rPr>
-              <a:t>/</a:t>
-            </a:r>
-            <a:r>
-              <a:rPr lang="fi-FI" sz="1600" dirty="0" err="1">
-                <a:solidFill>
-                  <a:schemeClr val="tx2"/>
-                </a:solidFill>
-              </a:rPr>
-              <a:t>Annotations</a:t>
-            </a:r>
-            <a:r>
-              <a:rPr lang="fi-FI" sz="1600" dirty="0">
-                <a:solidFill>
-                  <a:schemeClr val="tx2"/>
-                </a:solidFill>
-              </a:rPr>
-              <a:t>/</a:t>
-            </a:r>
-            <a:r>
-              <a:rPr lang="fi-FI" sz="1600" dirty="0" err="1">
-                <a:solidFill>
-                  <a:schemeClr val="tx2"/>
-                </a:solidFill>
-              </a:rPr>
-              <a:t>Configurations</a:t>
-            </a:r>
-            <a:endParaRPr lang="fi-FI" sz="1600" dirty="0" smtClean="0">
+              <a:t>Templates</a:t>
+            </a:r>
+            <a:r>
+              <a:rPr lang="fi-FI" sz="1600" dirty="0">
+                <a:solidFill>
+                  <a:schemeClr val="tx2"/>
+                </a:solidFill>
+              </a:rPr>
+              <a:t> </a:t>
+            </a:r>
+            <a:r>
+              <a:rPr lang="fi-FI" sz="1600" dirty="0" err="1">
+                <a:solidFill>
+                  <a:schemeClr val="tx2"/>
+                </a:solidFill>
+              </a:rPr>
+              <a:t>helping</a:t>
+            </a:r>
+            <a:r>
+              <a:rPr lang="fi-FI" sz="1600" dirty="0">
+                <a:solidFill>
+                  <a:schemeClr val="tx2"/>
+                </a:solidFill>
+              </a:rPr>
+              <a:t> (</a:t>
+            </a:r>
+            <a:r>
+              <a:rPr lang="fi-FI" sz="1600" dirty="0" err="1">
+                <a:solidFill>
+                  <a:schemeClr val="tx2"/>
+                </a:solidFill>
+              </a:rPr>
+              <a:t>Spring</a:t>
+            </a:r>
+            <a:r>
+              <a:rPr lang="fi-FI" sz="1600" dirty="0">
+                <a:solidFill>
+                  <a:schemeClr val="tx2"/>
+                </a:solidFill>
+              </a:rPr>
+              <a:t> </a:t>
+            </a:r>
+            <a:r>
+              <a:rPr lang="fi-FI" sz="1600" dirty="0" err="1">
+                <a:solidFill>
+                  <a:schemeClr val="tx2"/>
+                </a:solidFill>
+              </a:rPr>
+              <a:t>Boot</a:t>
+            </a:r>
+            <a:r>
+              <a:rPr lang="fi-FI" sz="1600" dirty="0">
+                <a:solidFill>
+                  <a:schemeClr val="tx2"/>
+                </a:solidFill>
+              </a:rPr>
+              <a:t>, MVC..)</a:t>
+            </a:r>
+            <a:endParaRPr lang="en-US" sz="1600" dirty="0">
               <a:solidFill>
                 <a:schemeClr val="tx2"/>
               </a:solidFill>
@@ -5614,15 +5366,45 @@
               <a:buChar char="•"/>
             </a:pPr>
             <a:r>
-              <a:rPr lang="fi-FI" sz="1600" dirty="0" err="1" smtClean="0">
-                <a:solidFill>
-                  <a:schemeClr val="tx2"/>
-                </a:solidFill>
-              </a:rPr>
-              <a:t>Templates</a:t>
-            </a:r>
-            <a:r>
-              <a:rPr lang="fi-FI" sz="1600" dirty="0" smtClean="0">
+              <a:rPr lang="en-US" sz="1600" dirty="0">
+                <a:solidFill>
+                  <a:schemeClr val="tx2"/>
+                </a:solidFill>
+              </a:rPr>
+              <a:t>Database, Database connection, Database user authentication and authorization, (Database encryption)</a:t>
+            </a:r>
+          </a:p>
+          <a:p>
+            <a:pPr marL="285750" indent="-285750">
+              <a:buFont typeface="Arial" panose="020B0604020202020204" pitchFamily="34" charset="0"/>
+              <a:buChar char="•"/>
+            </a:pPr>
+            <a:r>
+              <a:rPr lang="fi-FI" sz="1600" dirty="0" err="1">
+                <a:solidFill>
+                  <a:schemeClr val="tx2"/>
+                </a:solidFill>
+              </a:rPr>
+              <a:t>Support</a:t>
+            </a:r>
+            <a:r>
+              <a:rPr lang="fi-FI" sz="1600" dirty="0">
+                <a:solidFill>
+                  <a:schemeClr val="tx2"/>
+                </a:solidFill>
+              </a:rPr>
+              <a:t> for </a:t>
+            </a:r>
+            <a:r>
+              <a:rPr lang="fi-FI" sz="1600" dirty="0" err="1">
+                <a:solidFill>
+                  <a:schemeClr val="tx2"/>
+                </a:solidFill>
+              </a:rPr>
+              <a:t>the</a:t>
+            </a:r>
+            <a:r>
+              <a:rPr lang="fi-FI" sz="1600" dirty="0">
                 <a:solidFill>
                   <a:schemeClr val="tx2"/>
                 </a:solidFill>
@@ -5630,15 +5412,15 @@
               <a:t> </a:t>
             </a:r>
             <a:r>
-              <a:rPr lang="fi-FI" sz="1600" dirty="0" err="1" smtClean="0">
-                <a:solidFill>
-                  <a:schemeClr val="tx2"/>
-                </a:solidFill>
-              </a:rPr>
-              <a:t>helping</a:t>
-            </a:r>
-            <a:r>
-              <a:rPr lang="fi-FI" sz="1600" dirty="0" smtClean="0">
+              <a:rPr lang="fi-FI" sz="1600" dirty="0" err="1">
+                <a:solidFill>
+                  <a:schemeClr val="tx2"/>
+                </a:solidFill>
+              </a:rPr>
+              <a:t>carrier</a:t>
+            </a:r>
+            <a:r>
+              <a:rPr lang="fi-FI" sz="1600" dirty="0">
                 <a:solidFill>
                   <a:schemeClr val="tx2"/>
                 </a:solidFill>
@@ -5646,46 +5428,68 @@
               <a:t> </a:t>
             </a:r>
             <a:r>
-              <a:rPr lang="fi-FI" sz="1600" dirty="0" smtClean="0">
-                <a:solidFill>
-                  <a:schemeClr val="tx2"/>
-                </a:solidFill>
-              </a:rPr>
-              <a:t>(</a:t>
-            </a:r>
-            <a:r>
-              <a:rPr lang="fi-FI" sz="1600" dirty="0" err="1" smtClean="0">
-                <a:solidFill>
-                  <a:schemeClr val="tx2"/>
-                </a:solidFill>
-              </a:rPr>
-              <a:t>Spring</a:t>
-            </a:r>
-            <a:r>
-              <a:rPr lang="fi-FI" sz="1600" dirty="0" smtClean="0">
-                <a:solidFill>
-                  <a:schemeClr val="tx2"/>
-                </a:solidFill>
-              </a:rPr>
-              <a:t> </a:t>
-            </a:r>
-            <a:r>
-              <a:rPr lang="fi-FI" sz="1600" dirty="0" err="1" smtClean="0">
-                <a:solidFill>
-                  <a:schemeClr val="tx2"/>
-                </a:solidFill>
-              </a:rPr>
-              <a:t>Boot</a:t>
-            </a:r>
-            <a:r>
-              <a:rPr lang="fi-FI" sz="1600" dirty="0" smtClean="0">
-                <a:solidFill>
-                  <a:schemeClr val="tx2"/>
-                </a:solidFill>
-              </a:rPr>
-              <a:t>, MVC..)</a:t>
-            </a:r>
-            <a:endParaRPr lang="en-US" sz="1600" dirty="0" smtClean="0">
+              <a:rPr lang="fi-FI" sz="1600" dirty="0" err="1">
+                <a:solidFill>
+                  <a:schemeClr val="tx2"/>
+                </a:solidFill>
+              </a:rPr>
+              <a:t>security</a:t>
+            </a:r>
+            <a:r>
+              <a:rPr lang="fi-FI" sz="1600" dirty="0">
+                <a:solidFill>
+                  <a:schemeClr val="tx2"/>
+                </a:solidFill>
+              </a:rPr>
+              <a:t> (</a:t>
+            </a:r>
+            <a:r>
+              <a:rPr lang="fi-FI" sz="1600" dirty="0" err="1">
+                <a:solidFill>
+                  <a:schemeClr val="tx2"/>
+                </a:solidFill>
+              </a:rPr>
+              <a:t>server</a:t>
+            </a:r>
+            <a:r>
+              <a:rPr lang="fi-FI" sz="1600" dirty="0">
+                <a:solidFill>
+                  <a:schemeClr val="tx2"/>
+                </a:solidFill>
+              </a:rPr>
+              <a:t>-side)</a:t>
+            </a:r>
+          </a:p>
+          <a:p>
+            <a:pPr marL="285750" indent="-285750">
+              <a:buFont typeface="Arial" panose="020B0604020202020204" pitchFamily="34" charset="0"/>
+              <a:buChar char="•"/>
+            </a:pPr>
+            <a:r>
+              <a:rPr lang="fi-FI" sz="1600">
+                <a:solidFill>
+                  <a:schemeClr val="tx2"/>
+                </a:solidFill>
+              </a:rPr>
+              <a:t>Web Services, </a:t>
+            </a:r>
+            <a:r>
+              <a:rPr lang="fi-FI" sz="1600" dirty="0" err="1">
+                <a:solidFill>
+                  <a:schemeClr val="tx2"/>
+                </a:solidFill>
+              </a:rPr>
+              <a:t>sockets</a:t>
+            </a:r>
+            <a:r>
+              <a:rPr lang="fi-FI" sz="1600" dirty="0">
+                <a:solidFill>
+                  <a:schemeClr val="tx2"/>
+                </a:solidFill>
+              </a:rPr>
+              <a:t>, …</a:t>
+            </a:r>
+            <a:endParaRPr lang="en-US" sz="1600" dirty="0">
               <a:solidFill>
                 <a:schemeClr val="tx2"/>
               </a:solidFill>
@@ -5696,179 +5500,7 @@
               <a:buFont typeface="Arial" panose="020B0604020202020204" pitchFamily="34" charset="0"/>
               <a:buChar char="•"/>
             </a:pPr>
-            <a:r>
-              <a:rPr lang="en-US" sz="1600" dirty="0" smtClean="0">
-                <a:solidFill>
-                  <a:schemeClr val="tx2"/>
-                </a:solidFill>
-              </a:rPr>
-              <a:t>Database, Database connection, Database user </a:t>
-            </a:r>
-            <a:r>
-              <a:rPr lang="en-US" sz="1600" dirty="0" smtClean="0">
-                <a:solidFill>
-                  <a:schemeClr val="tx2"/>
-                </a:solidFill>
-              </a:rPr>
-              <a:t>authentication and authorization, </a:t>
-            </a:r>
-            <a:r>
-              <a:rPr lang="en-US" sz="1600" dirty="0" smtClean="0">
-                <a:solidFill>
-                  <a:schemeClr val="tx2"/>
-                </a:solidFill>
-              </a:rPr>
-              <a:t>(Database encryption)</a:t>
-            </a:r>
-          </a:p>
-          <a:p>
-            <a:pPr marL="285750" indent="-285750">
-              <a:buFont typeface="Arial" panose="020B0604020202020204" pitchFamily="34" charset="0"/>
-              <a:buChar char="•"/>
-            </a:pPr>
-            <a:r>
-              <a:rPr lang="fi-FI" sz="1600" dirty="0" err="1" smtClean="0">
-                <a:solidFill>
-                  <a:schemeClr val="tx2"/>
-                </a:solidFill>
-              </a:rPr>
-              <a:t>Support</a:t>
-            </a:r>
-            <a:r>
-              <a:rPr lang="fi-FI" sz="1600" dirty="0" smtClean="0">
-                <a:solidFill>
-                  <a:schemeClr val="tx2"/>
-                </a:solidFill>
-              </a:rPr>
-              <a:t> for </a:t>
-            </a:r>
-            <a:r>
-              <a:rPr lang="fi-FI" sz="1600" dirty="0" err="1" smtClean="0">
-                <a:solidFill>
-                  <a:schemeClr val="tx2"/>
-                </a:solidFill>
-              </a:rPr>
-              <a:t>the</a:t>
-            </a:r>
-            <a:r>
-              <a:rPr lang="fi-FI" sz="1600" dirty="0" smtClean="0">
-                <a:solidFill>
-                  <a:schemeClr val="tx2"/>
-                </a:solidFill>
-              </a:rPr>
-              <a:t> </a:t>
-            </a:r>
-            <a:r>
-              <a:rPr lang="fi-FI" sz="1600" dirty="0" err="1" smtClean="0">
-                <a:solidFill>
-                  <a:schemeClr val="tx2"/>
-                </a:solidFill>
-              </a:rPr>
-              <a:t>carrier</a:t>
-            </a:r>
-            <a:r>
-              <a:rPr lang="fi-FI" sz="1600" dirty="0" smtClean="0">
-                <a:solidFill>
-                  <a:schemeClr val="tx2"/>
-                </a:solidFill>
-              </a:rPr>
-              <a:t> </a:t>
-            </a:r>
-            <a:r>
-              <a:rPr lang="fi-FI" sz="1600" dirty="0" err="1" smtClean="0">
-                <a:solidFill>
-                  <a:schemeClr val="tx2"/>
-                </a:solidFill>
-              </a:rPr>
-              <a:t>security</a:t>
-            </a:r>
-            <a:r>
-              <a:rPr lang="fi-FI" sz="1600" dirty="0" smtClean="0">
-                <a:solidFill>
-                  <a:schemeClr val="tx2"/>
-                </a:solidFill>
-              </a:rPr>
-              <a:t> </a:t>
-            </a:r>
-            <a:r>
-              <a:rPr lang="fi-FI" sz="1600" dirty="0" smtClean="0">
-                <a:solidFill>
-                  <a:schemeClr val="tx2"/>
-                </a:solidFill>
-              </a:rPr>
-              <a:t>(</a:t>
-            </a:r>
-            <a:r>
-              <a:rPr lang="fi-FI" sz="1600" dirty="0" err="1" smtClean="0">
-                <a:solidFill>
-                  <a:schemeClr val="tx2"/>
-                </a:solidFill>
-              </a:rPr>
-              <a:t>server</a:t>
-            </a:r>
-            <a:r>
-              <a:rPr lang="fi-FI" sz="1600" dirty="0" smtClean="0">
-                <a:solidFill>
-                  <a:schemeClr val="tx2"/>
-                </a:solidFill>
-              </a:rPr>
-              <a:t>-side)</a:t>
-            </a:r>
-            <a:endParaRPr lang="fi-FI" sz="1600" dirty="0" smtClean="0">
-              <a:solidFill>
-                <a:schemeClr val="tx2"/>
-              </a:solidFill>
-            </a:endParaRPr>
-          </a:p>
-          <a:p>
-            <a:pPr marL="285750" indent="-285750">
-              <a:buFont typeface="Arial" panose="020B0604020202020204" pitchFamily="34" charset="0"/>
-              <a:buChar char="•"/>
-            </a:pPr>
-            <a:r>
-              <a:rPr lang="fi-FI" sz="1600" smtClean="0">
-                <a:solidFill>
-                  <a:schemeClr val="tx2"/>
-                </a:solidFill>
-              </a:rPr>
-              <a:t>Web </a:t>
-            </a:r>
-            <a:r>
-              <a:rPr lang="fi-FI" sz="1600" smtClean="0">
-                <a:solidFill>
-                  <a:schemeClr val="tx2"/>
-                </a:solidFill>
-              </a:rPr>
-              <a:t>Services, </a:t>
-            </a:r>
-            <a:r>
-              <a:rPr lang="fi-FI" sz="1600" dirty="0" err="1" smtClean="0">
-                <a:solidFill>
-                  <a:schemeClr val="tx2"/>
-                </a:solidFill>
-              </a:rPr>
-              <a:t>sockets</a:t>
-            </a:r>
-            <a:r>
-              <a:rPr lang="fi-FI" sz="1600" dirty="0" smtClean="0">
-                <a:solidFill>
-                  <a:schemeClr val="tx2"/>
-                </a:solidFill>
-              </a:rPr>
-              <a:t>, …</a:t>
-            </a:r>
-            <a:endParaRPr lang="en-US" sz="1600" dirty="0" smtClean="0">
-              <a:solidFill>
-                <a:schemeClr val="tx2"/>
-              </a:solidFill>
-            </a:endParaRPr>
-          </a:p>
-          <a:p>
-            <a:pPr marL="285750" indent="-285750">
-              <a:buFont typeface="Arial" panose="020B0604020202020204" pitchFamily="34" charset="0"/>
-              <a:buChar char="•"/>
-            </a:pPr>
-            <a:endParaRPr lang="en-US" dirty="0" smtClean="0">
+            <a:endParaRPr lang="en-US" dirty="0">
               <a:solidFill>
                 <a:schemeClr val="tx2"/>
               </a:solidFill>
@@ -5905,8 +5537,8 @@
           </a:lstStyle>
           <a:p>
             <a:r>
-              <a:rPr lang="fi-FI" dirty="0" smtClean="0"/>
-              <a:t>2017-11-06</a:t>
+              <a:rPr lang="fi-FI" dirty="0"/>
+              <a:t>2020-11-16</a:t>
             </a:r>
             <a:endParaRPr lang="en-US" dirty="0"/>
           </a:p>
@@ -5941,12 +5573,8 @@
           </a:lstStyle>
           <a:p>
             <a:r>
-              <a:rPr lang="fi-FI" dirty="0" smtClean="0"/>
-              <a:t>© Juhani </a:t>
-            </a:r>
-            <a:r>
-              <a:rPr lang="fi-FI" dirty="0" smtClean="0"/>
-              <a:t>Välimäki 2012-2017</a:t>
+              <a:rPr lang="fi-FI" dirty="0"/>
+              <a:t>© Juhani Välimäki 2012-2020</a:t>
             </a:r>
             <a:endParaRPr lang="en-US" dirty="0"/>
           </a:p>
@@ -6026,7 +5654,7 @@
           <a:lstStyle/>
           <a:p>
             <a:pPr algn="ctr"/>
-            <a:endParaRPr lang="fi-FI" b="1" dirty="0" smtClean="0">
+            <a:endParaRPr lang="fi-FI" b="1" dirty="0">
               <a:solidFill>
                 <a:schemeClr val="tx2"/>
               </a:solidFill>
@@ -6035,7 +5663,7 @@
           <a:p>
             <a:pPr algn="ctr"/>
             <a:r>
-              <a:rPr lang="fi-FI" b="1" dirty="0" smtClean="0">
+              <a:rPr lang="fi-FI" b="1" dirty="0">
                 <a:solidFill>
                   <a:schemeClr val="tx2"/>
                 </a:solidFill>
@@ -6054,7 +5682,7 @@
           <a:p>
             <a:pPr algn="ctr"/>
             <a:r>
-              <a:rPr lang="fi-FI" b="1" dirty="0" smtClean="0">
+              <a:rPr lang="fi-FI" b="1" dirty="0">
                 <a:solidFill>
                   <a:schemeClr val="tx2"/>
                 </a:solidFill>
@@ -6079,13 +5707,6 @@
   <p:clrMapOvr>
     <a:masterClrMapping/>
   </p:clrMapOvr>
-  <p:timing>
-    <p:tnLst>
-      <p:par>
-        <p:cTn id="1" dur="indefinite" restart="never" nodeType="tmRoot"/>
-      </p:par>
-    </p:tnLst>
-  </p:timing>
 </p:sld>
 </file>
 

</xml_diff>

<commit_message>
Some updates to texts
</commit_message>
<xml_diff>
--- a/Responsibilities_services_or_components_ClientCarrierServer.pptx
+++ b/Responsibilities_services_or_components_ClientCarrierServer.pptx
@@ -440,7 +440,7 @@
           <a:p>
             <a:fld id="{7DDC757A-7F51-4268-BF37-8465B749C48A}" type="datetimeFigureOut">
               <a:rPr lang="en-US" smtClean="0"/>
-              <a:t>11/16/2020</a:t>
+              <a:t>3/18/2021</a:t>
             </a:fld>
             <a:endParaRPr lang="en-US"/>
           </a:p>
@@ -618,7 +618,7 @@
           <a:p>
             <a:fld id="{7DDC757A-7F51-4268-BF37-8465B749C48A}" type="datetimeFigureOut">
               <a:rPr lang="en-US" smtClean="0"/>
-              <a:t>11/16/2020</a:t>
+              <a:t>3/18/2021</a:t>
             </a:fld>
             <a:endParaRPr lang="en-US"/>
           </a:p>
@@ -786,7 +786,7 @@
           <a:p>
             <a:fld id="{7DDC757A-7F51-4268-BF37-8465B749C48A}" type="datetimeFigureOut">
               <a:rPr lang="en-US" smtClean="0"/>
-              <a:t>11/16/2020</a:t>
+              <a:t>3/18/2021</a:t>
             </a:fld>
             <a:endParaRPr lang="en-US"/>
           </a:p>
@@ -1031,7 +1031,7 @@
           <a:p>
             <a:fld id="{7DDC757A-7F51-4268-BF37-8465B749C48A}" type="datetimeFigureOut">
               <a:rPr lang="en-US" smtClean="0"/>
-              <a:t>11/16/2020</a:t>
+              <a:t>3/18/2021</a:t>
             </a:fld>
             <a:endParaRPr lang="en-US"/>
           </a:p>
@@ -1260,7 +1260,7 @@
           <a:p>
             <a:fld id="{7DDC757A-7F51-4268-BF37-8465B749C48A}" type="datetimeFigureOut">
               <a:rPr lang="en-US" smtClean="0"/>
-              <a:t>11/16/2020</a:t>
+              <a:t>3/18/2021</a:t>
             </a:fld>
             <a:endParaRPr lang="en-US"/>
           </a:p>
@@ -1624,7 +1624,7 @@
           <a:p>
             <a:fld id="{7DDC757A-7F51-4268-BF37-8465B749C48A}" type="datetimeFigureOut">
               <a:rPr lang="en-US" smtClean="0"/>
-              <a:t>11/16/2020</a:t>
+              <a:t>3/18/2021</a:t>
             </a:fld>
             <a:endParaRPr lang="en-US"/>
           </a:p>
@@ -1741,7 +1741,7 @@
           <a:p>
             <a:fld id="{7DDC757A-7F51-4268-BF37-8465B749C48A}" type="datetimeFigureOut">
               <a:rPr lang="en-US" smtClean="0"/>
-              <a:t>11/16/2020</a:t>
+              <a:t>3/18/2021</a:t>
             </a:fld>
             <a:endParaRPr lang="en-US"/>
           </a:p>
@@ -1836,7 +1836,7 @@
           <a:p>
             <a:fld id="{7DDC757A-7F51-4268-BF37-8465B749C48A}" type="datetimeFigureOut">
               <a:rPr lang="en-US" smtClean="0"/>
-              <a:t>11/16/2020</a:t>
+              <a:t>3/18/2021</a:t>
             </a:fld>
             <a:endParaRPr lang="en-US"/>
           </a:p>
@@ -2111,7 +2111,7 @@
           <a:p>
             <a:fld id="{7DDC757A-7F51-4268-BF37-8465B749C48A}" type="datetimeFigureOut">
               <a:rPr lang="en-US" smtClean="0"/>
-              <a:t>11/16/2020</a:t>
+              <a:t>3/18/2021</a:t>
             </a:fld>
             <a:endParaRPr lang="en-US"/>
           </a:p>
@@ -2363,7 +2363,7 @@
           <a:p>
             <a:fld id="{7DDC757A-7F51-4268-BF37-8465B749C48A}" type="datetimeFigureOut">
               <a:rPr lang="en-US" smtClean="0"/>
-              <a:t>11/16/2020</a:t>
+              <a:t>3/18/2021</a:t>
             </a:fld>
             <a:endParaRPr lang="en-US"/>
           </a:p>
@@ -2574,7 +2574,7 @@
           <a:p>
             <a:fld id="{7DDC757A-7F51-4268-BF37-8465B749C48A}" type="datetimeFigureOut">
               <a:rPr lang="en-US" smtClean="0"/>
-              <a:t>11/16/2020</a:t>
+              <a:t>3/18/2021</a:t>
             </a:fld>
             <a:endParaRPr lang="en-US"/>
           </a:p>
@@ -3097,7 +3097,7 @@
           <a:p>
             <a:r>
               <a:rPr lang="fi-FI" dirty="0"/>
-              <a:t>2020-11-16</a:t>
+              <a:t>2021-03-18</a:t>
             </a:r>
             <a:endParaRPr lang="en-US" dirty="0"/>
           </a:p>
@@ -3139,7 +3139,7 @@
           <a:p>
             <a:r>
               <a:rPr lang="fi-FI" dirty="0"/>
-              <a:t>© Juhani Välimäki 2012-2020</a:t>
+              <a:t>© Juhani Välimäki 2012-2021</a:t>
             </a:r>
             <a:endParaRPr lang="en-US" dirty="0"/>
           </a:p>
@@ -3570,7 +3570,7 @@
           <a:p>
             <a:r>
               <a:rPr lang="fi-FI" dirty="0"/>
-              <a:t>2020-11-16</a:t>
+              <a:t>2021-03-18</a:t>
             </a:r>
             <a:endParaRPr lang="en-US" dirty="0"/>
           </a:p>
@@ -3612,7 +3612,7 @@
           <a:p>
             <a:r>
               <a:rPr lang="fi-FI" dirty="0"/>
-              <a:t>© Juhani Välimäki 2012-2020</a:t>
+              <a:t>© Juhani Välimäki 2012-2021</a:t>
             </a:r>
             <a:endParaRPr lang="en-US" dirty="0"/>
           </a:p>
@@ -3833,23 +3833,7 @@
                   <a:schemeClr val="tx2"/>
                 </a:solidFill>
               </a:rPr>
-              <a:t>Runs AJAX request </a:t>
-            </a:r>
-            <a:r>
-              <a:rPr lang="en-US" sz="1600">
-                <a:solidFill>
-                  <a:schemeClr val="tx2"/>
-                </a:solidFill>
-              </a:rPr>
-              <a:t>and receives </a:t>
-            </a:r>
-            <a:r>
-              <a:rPr lang="en-US" sz="1600" dirty="0">
-                <a:solidFill>
-                  <a:schemeClr val="tx2"/>
-                </a:solidFill>
-              </a:rPr>
-              <a:t>responses</a:t>
+              <a:t>Runs AJAX request and receives responses</a:t>
             </a:r>
           </a:p>
           <a:p>
@@ -5538,7 +5522,7 @@
           <a:p>
             <a:r>
               <a:rPr lang="fi-FI" dirty="0"/>
-              <a:t>2020-11-16</a:t>
+              <a:t>2021-03-18</a:t>
             </a:r>
             <a:endParaRPr lang="en-US" dirty="0"/>
           </a:p>
@@ -5574,7 +5558,7 @@
           <a:p>
             <a:r>
               <a:rPr lang="fi-FI" dirty="0"/>
-              <a:t>© Juhani Välimäki 2012-2020</a:t>
+              <a:t>© Juhani Välimäki 2012-2021</a:t>
             </a:r>
             <a:endParaRPr lang="en-US" dirty="0"/>
           </a:p>

</xml_diff>